<commit_message>
modify tech review slides with Folium info
</commit_message>
<xml_diff>
--- a/doc/Technology_Review_Presentation.pptx
+++ b/doc/Technology_Review_Presentation.pptx
@@ -8,9 +8,9 @@
     <p:sldId id="258" r:id="rId2"/>
     <p:sldId id="256" r:id="rId3"/>
     <p:sldId id="257" r:id="rId4"/>
-    <p:sldId id="259" r:id="rId5"/>
-    <p:sldId id="260" r:id="rId6"/>
-    <p:sldId id="261" r:id="rId7"/>
+    <p:sldId id="260" r:id="rId5"/>
+    <p:sldId id="261" r:id="rId6"/>
+    <p:sldId id="263" r:id="rId7"/>
   </p:sldIdLst>
   <p:sldSz cx="12192000" cy="6858000"/>
   <p:notesSz cx="6858000" cy="9144000"/>
@@ -197,7 +197,7 @@
         </pc:picChg>
       </pc:sldChg>
       <pc:sldChg chg="add del">
-        <pc:chgData name="Geoff Coyner" userId="c41f8547ae985f2b" providerId="LiveId" clId="{B900DB88-F8BB-42E6-B2BF-51ED76B92083}" dt="2018-05-07T20:39:49.675" v="504"/>
+        <pc:chgData name="Geoff Coyner" userId="c41f8547ae985f2b" providerId="LiveId" clId="{B900DB88-F8BB-42E6-B2BF-51ED76B92083}" dt="2018-05-07T20:39:49.675" v="504" actId="20577"/>
         <pc:sldMkLst>
           <pc:docMk/>
           <pc:sldMk cId="3554021923" sldId="262"/>
@@ -3916,200 +3916,6 @@
             </a:br>
             <a:r>
               <a:rPr lang="en-US" dirty="0"/>
-              <a:t>Background </a:t>
-            </a:r>
-          </a:p>
-        </p:txBody>
-      </p:sp>
-      <p:sp>
-        <p:nvSpPr>
-          <p:cNvPr id="5" name="Content Placeholder 4">
-            <a:extLst>
-              <a:ext uri="{FF2B5EF4-FFF2-40B4-BE49-F238E27FC236}">
-                <a16:creationId xmlns:a16="http://schemas.microsoft.com/office/drawing/2014/main" id="{B4EDDEBC-0B60-4E89-A8C1-3CFC2F1D8AA6}"/>
-              </a:ext>
-            </a:extLst>
-          </p:cNvPr>
-          <p:cNvSpPr>
-            <a:spLocks noGrp="1"/>
-          </p:cNvSpPr>
-          <p:nvPr>
-            <p:ph idx="1"/>
-          </p:nvPr>
-        </p:nvSpPr>
-        <p:spPr/>
-        <p:txBody>
-          <a:bodyPr/>
-          <a:lstStyle/>
-          <a:p>
-            <a:r>
-              <a:rPr lang="en-US" b="1" dirty="0">
-                <a:solidFill>
-                  <a:schemeClr val="accent1"/>
-                </a:solidFill>
-              </a:rPr>
-              <a:t>Where</a:t>
-            </a:r>
-            <a:r>
-              <a:rPr lang="en-US" dirty="0"/>
-              <a:t> do accidents occur in Seattle?</a:t>
-            </a:r>
-          </a:p>
-          <a:p>
-            <a:r>
-              <a:rPr lang="en-US" dirty="0"/>
-              <a:t>Is there a relationship between weather and driving?</a:t>
-            </a:r>
-          </a:p>
-          <a:p>
-            <a:r>
-              <a:rPr lang="en-US" dirty="0"/>
-              <a:t>Do different types of accidents happen in </a:t>
-            </a:r>
-            <a:r>
-              <a:rPr lang="en-US" b="1" dirty="0">
-                <a:solidFill>
-                  <a:schemeClr val="accent1"/>
-                </a:solidFill>
-              </a:rPr>
-              <a:t>different neighborhoods </a:t>
-            </a:r>
-            <a:r>
-              <a:rPr lang="en-US" dirty="0"/>
-              <a:t>with different levels of crime (measured by 911 calls)?</a:t>
-            </a:r>
-          </a:p>
-          <a:p>
-            <a:r>
-              <a:rPr lang="en-US" dirty="0"/>
-              <a:t>Have the number of accidents changed over time? Can we see the change in Seattle </a:t>
-            </a:r>
-            <a:r>
-              <a:rPr lang="en-US" b="1" dirty="0">
-                <a:solidFill>
-                  <a:schemeClr val="accent1"/>
-                </a:solidFill>
-              </a:rPr>
-              <a:t>speed limits </a:t>
-            </a:r>
-            <a:r>
-              <a:rPr lang="en-US" dirty="0"/>
-              <a:t>in the Seattle collision data?</a:t>
-            </a:r>
-          </a:p>
-          <a:p>
-            <a:r>
-              <a:rPr lang="en-US" dirty="0"/>
-              <a:t>If the user has similar data for another city, they can use the methods we create on their own data.</a:t>
-            </a:r>
-          </a:p>
-          <a:p>
-            <a:pPr marL="0" indent="0">
-              <a:buNone/>
-            </a:pPr>
-            <a:endParaRPr lang="en-US" dirty="0"/>
-          </a:p>
-        </p:txBody>
-      </p:sp>
-      <p:sp>
-        <p:nvSpPr>
-          <p:cNvPr id="2" name="TextBox 1">
-            <a:extLst>
-              <a:ext uri="{FF2B5EF4-FFF2-40B4-BE49-F238E27FC236}">
-                <a16:creationId xmlns:a16="http://schemas.microsoft.com/office/drawing/2014/main" id="{E7F3C10C-8E27-424B-874E-80AB597D4E28}"/>
-              </a:ext>
-            </a:extLst>
-          </p:cNvPr>
-          <p:cNvSpPr txBox="1"/>
-          <p:nvPr/>
-        </p:nvSpPr>
-        <p:spPr>
-          <a:xfrm>
-            <a:off x="925286" y="5884575"/>
-            <a:ext cx="8656472" cy="584775"/>
-          </a:xfrm>
-          <a:prstGeom prst="rect">
-            <a:avLst/>
-          </a:prstGeom>
-          <a:noFill/>
-        </p:spPr>
-        <p:txBody>
-          <a:bodyPr wrap="none" rtlCol="0">
-            <a:spAutoFit/>
-          </a:bodyPr>
-          <a:lstStyle/>
-          <a:p>
-            <a:r>
-              <a:rPr lang="en-US" sz="3200" b="1" dirty="0">
-                <a:solidFill>
-                  <a:schemeClr val="accent1"/>
-                </a:solidFill>
-              </a:rPr>
-              <a:t>Maps necessary to understand these questions!!! </a:t>
-            </a:r>
-          </a:p>
-        </p:txBody>
-      </p:sp>
-    </p:spTree>
-    <p:extLst>
-      <p:ext uri="{BB962C8B-B14F-4D97-AF65-F5344CB8AC3E}">
-        <p14:creationId xmlns:p14="http://schemas.microsoft.com/office/powerpoint/2010/main" val="1292494186"/>
-      </p:ext>
-    </p:extLst>
-  </p:cSld>
-  <p:clrMapOvr>
-    <a:masterClrMapping/>
-  </p:clrMapOvr>
-</p:sld>
-</file>
-
-<file path=ppt/slides/slide5.xml><?xml version="1.0" encoding="utf-8"?>
-<p:sld xmlns:a="http://schemas.openxmlformats.org/drawingml/2006/main" xmlns:r="http://schemas.openxmlformats.org/officeDocument/2006/relationships" xmlns:p="http://schemas.openxmlformats.org/presentationml/2006/main">
-  <p:cSld>
-    <p:spTree>
-      <p:nvGrpSpPr>
-        <p:cNvPr id="1" name=""/>
-        <p:cNvGrpSpPr/>
-        <p:nvPr/>
-      </p:nvGrpSpPr>
-      <p:grpSpPr>
-        <a:xfrm>
-          <a:off x="0" y="0"/>
-          <a:ext cx="0" cy="0"/>
-          <a:chOff x="0" y="0"/>
-          <a:chExt cx="0" cy="0"/>
-        </a:xfrm>
-      </p:grpSpPr>
-      <p:sp>
-        <p:nvSpPr>
-          <p:cNvPr id="4" name="Title 3">
-            <a:extLst>
-              <a:ext uri="{FF2B5EF4-FFF2-40B4-BE49-F238E27FC236}">
-                <a16:creationId xmlns:a16="http://schemas.microsoft.com/office/drawing/2014/main" id="{3C0B0A9A-2705-4AA3-9255-5BD4A8B31D95}"/>
-              </a:ext>
-            </a:extLst>
-          </p:cNvPr>
-          <p:cNvSpPr>
-            <a:spLocks noGrp="1"/>
-          </p:cNvSpPr>
-          <p:nvPr>
-            <p:ph type="title"/>
-          </p:nvPr>
-        </p:nvSpPr>
-        <p:spPr/>
-        <p:txBody>
-          <a:bodyPr/>
-          <a:lstStyle/>
-          <a:p>
-            <a:r>
-              <a:rPr lang="en-US" sz="3600" dirty="0"/>
-              <a:t>Collisions in Washington State</a:t>
-            </a:r>
-            <a:br>
-              <a:rPr lang="en-US" dirty="0"/>
-            </a:br>
-            <a:r>
-              <a:rPr lang="en-US" dirty="0"/>
               <a:t>Using Folium </a:t>
             </a:r>
           </a:p>
@@ -4235,6 +4041,263 @@
 </p:sld>
 </file>
 
+<file path=ppt/slides/slide5.xml><?xml version="1.0" encoding="utf-8"?>
+<p:sld xmlns:a="http://schemas.openxmlformats.org/drawingml/2006/main" xmlns:r="http://schemas.openxmlformats.org/officeDocument/2006/relationships" xmlns:p="http://schemas.openxmlformats.org/presentationml/2006/main">
+  <p:cSld>
+    <p:spTree>
+      <p:nvGrpSpPr>
+        <p:cNvPr id="1" name=""/>
+        <p:cNvGrpSpPr/>
+        <p:nvPr/>
+      </p:nvGrpSpPr>
+      <p:grpSpPr>
+        <a:xfrm>
+          <a:off x="0" y="0"/>
+          <a:ext cx="0" cy="0"/>
+          <a:chOff x="0" y="0"/>
+          <a:chExt cx="0" cy="0"/>
+        </a:xfrm>
+      </p:grpSpPr>
+      <p:sp>
+        <p:nvSpPr>
+          <p:cNvPr id="4" name="Title 3">
+            <a:extLst>
+              <a:ext uri="{FF2B5EF4-FFF2-40B4-BE49-F238E27FC236}">
+                <a16:creationId xmlns:a16="http://schemas.microsoft.com/office/drawing/2014/main" id="{3C0B0A9A-2705-4AA3-9255-5BD4A8B31D95}"/>
+              </a:ext>
+            </a:extLst>
+          </p:cNvPr>
+          <p:cNvSpPr>
+            <a:spLocks noGrp="1"/>
+          </p:cNvSpPr>
+          <p:nvPr>
+            <p:ph type="title"/>
+          </p:nvPr>
+        </p:nvSpPr>
+        <p:spPr/>
+        <p:txBody>
+          <a:bodyPr/>
+          <a:lstStyle/>
+          <a:p>
+            <a:r>
+              <a:rPr lang="en-US" sz="3600" dirty="0"/>
+              <a:t>Collisions in Washington State</a:t>
+            </a:r>
+            <a:br>
+              <a:rPr lang="en-US" dirty="0"/>
+            </a:br>
+            <a:r>
+              <a:rPr lang="en-US" dirty="0"/>
+              <a:t>Using Folium </a:t>
+            </a:r>
+          </a:p>
+        </p:txBody>
+      </p:sp>
+      <p:sp>
+        <p:nvSpPr>
+          <p:cNvPr id="8" name="Content Placeholder 4">
+            <a:extLst>
+              <a:ext uri="{FF2B5EF4-FFF2-40B4-BE49-F238E27FC236}">
+                <a16:creationId xmlns:a16="http://schemas.microsoft.com/office/drawing/2014/main" id="{A4ED4195-C0DD-4DB3-B7B1-A753E90C2BA7}"/>
+              </a:ext>
+            </a:extLst>
+          </p:cNvPr>
+          <p:cNvSpPr>
+            <a:spLocks noGrp="1"/>
+          </p:cNvSpPr>
+          <p:nvPr>
+            <p:ph idx="1"/>
+          </p:nvPr>
+        </p:nvSpPr>
+        <p:spPr>
+          <a:xfrm>
+            <a:off x="653561" y="1588232"/>
+            <a:ext cx="10515600" cy="4351338"/>
+          </a:xfrm>
+        </p:spPr>
+        <p:txBody>
+          <a:bodyPr>
+            <a:normAutofit fontScale="85000" lnSpcReduction="20000"/>
+          </a:bodyPr>
+          <a:lstStyle/>
+          <a:p>
+            <a:r>
+              <a:rPr lang="en-US" dirty="0"/>
+              <a:t>Appeal</a:t>
+            </a:r>
+          </a:p>
+          <a:p>
+            <a:pPr lvl="1"/>
+            <a:r>
+              <a:rPr lang="en-US" dirty="0"/>
+              <a:t>Easy to quickly plot &amp; cluster any </a:t>
+            </a:r>
+            <a:r>
+              <a:rPr lang="en-US" dirty="0" err="1"/>
+              <a:t>lat</a:t>
+            </a:r>
+            <a:r>
+              <a:rPr lang="en-US" dirty="0"/>
+              <a:t>/</a:t>
+            </a:r>
+            <a:r>
+              <a:rPr lang="en-US" dirty="0" err="1"/>
+              <a:t>lon</a:t>
+            </a:r>
+            <a:r>
+              <a:rPr lang="en-US" dirty="0"/>
+              <a:t> data</a:t>
+            </a:r>
+          </a:p>
+          <a:p>
+            <a:pPr lvl="1"/>
+            <a:r>
+              <a:rPr lang="en-US" dirty="0"/>
+              <a:t>Seems to work with shape files or </a:t>
+            </a:r>
+            <a:r>
+              <a:rPr lang="en-US" dirty="0" err="1"/>
+              <a:t>choropeth</a:t>
+            </a:r>
+            <a:r>
+              <a:rPr lang="en-US" dirty="0"/>
+              <a:t> mapping </a:t>
+            </a:r>
+          </a:p>
+          <a:p>
+            <a:pPr lvl="1"/>
+            <a:r>
+              <a:rPr lang="en-US" dirty="0"/>
+              <a:t>Lots of flexibility on map appearance and 3</a:t>
+            </a:r>
+            <a:r>
+              <a:rPr lang="en-US" baseline="30000" dirty="0"/>
+              <a:t>rd</a:t>
+            </a:r>
+            <a:r>
+              <a:rPr lang="en-US" dirty="0"/>
+              <a:t> party plug-ins</a:t>
+            </a:r>
+          </a:p>
+          <a:p>
+            <a:pPr lvl="1"/>
+            <a:r>
+              <a:rPr lang="en-US" dirty="0"/>
+              <a:t>Builds on top of Leaflet, so includes many of it’s capabilities?</a:t>
+            </a:r>
+          </a:p>
+          <a:p>
+            <a:pPr lvl="1"/>
+            <a:r>
+              <a:rPr lang="en-US" altLang="zh-CN" dirty="0"/>
+              <a:t>Less mature but more active project maintenance recently than Dash (20 vs. 6 closed issues in the last month; 730 vs. 450 forks; 3,000 vs. 4,800 stars)</a:t>
+            </a:r>
+            <a:endParaRPr lang="en-US" dirty="0"/>
+          </a:p>
+          <a:p>
+            <a:r>
+              <a:rPr lang="en-US" dirty="0"/>
+              <a:t>Drawbacks</a:t>
+            </a:r>
+          </a:p>
+          <a:p>
+            <a:pPr lvl="1"/>
+            <a:r>
+              <a:rPr lang="en-US" dirty="0"/>
+              <a:t>Not as easy to make interactive dashboards as </a:t>
+            </a:r>
+            <a:r>
+              <a:rPr lang="en-US" dirty="0" err="1"/>
+              <a:t>plotly</a:t>
+            </a:r>
+            <a:r>
+              <a:rPr lang="en-US" dirty="0"/>
+              <a:t>? (investigating the </a:t>
+            </a:r>
+            <a:r>
+              <a:rPr lang="en-US" dirty="0" err="1"/>
+              <a:t>HeatMapWithTime</a:t>
+            </a:r>
+            <a:r>
+              <a:rPr lang="en-US" dirty="0"/>
+              <a:t> plugin)</a:t>
+            </a:r>
+          </a:p>
+          <a:p>
+            <a:pPr lvl="1"/>
+            <a:r>
+              <a:rPr lang="en-US" dirty="0"/>
+              <a:t>Adding &gt;1000 markers seems slow (there may be a plugin to fix this?)</a:t>
+            </a:r>
+          </a:p>
+          <a:p>
+            <a:pPr lvl="1"/>
+            <a:r>
+              <a:rPr lang="en-US" dirty="0"/>
+              <a:t>Some example codes from the documentation site is outdated, maybe due to rapid updates recently?</a:t>
+            </a:r>
+          </a:p>
+          <a:p>
+            <a:pPr lvl="2"/>
+            <a:r>
+              <a:rPr lang="en-US" dirty="0"/>
+              <a:t>module 'folium' has no attribute '</a:t>
+            </a:r>
+            <a:r>
+              <a:rPr lang="en-US" dirty="0" err="1"/>
+              <a:t>raster_layers</a:t>
+            </a:r>
+            <a:r>
+              <a:rPr lang="en-US" dirty="0"/>
+              <a:t>’ </a:t>
+            </a:r>
+          </a:p>
+          <a:p>
+            <a:pPr lvl="2"/>
+            <a:r>
+              <a:rPr lang="en-US" dirty="0"/>
+              <a:t>Seems some functions of </a:t>
+            </a:r>
+            <a:r>
+              <a:rPr lang="en-US" dirty="0" err="1"/>
+              <a:t>branca</a:t>
+            </a:r>
+            <a:r>
+              <a:rPr lang="en-US" dirty="0"/>
+              <a:t> are degenerated (and there is no doc for </a:t>
+            </a:r>
+            <a:r>
+              <a:rPr lang="en-US" dirty="0" err="1"/>
+              <a:t>branca</a:t>
+            </a:r>
+            <a:r>
+              <a:rPr lang="en-US" dirty="0"/>
+              <a:t>)</a:t>
+            </a:r>
+          </a:p>
+          <a:p>
+            <a:pPr lvl="1"/>
+            <a:endParaRPr lang="en-US" dirty="0"/>
+          </a:p>
+          <a:p>
+            <a:pPr lvl="1"/>
+            <a:endParaRPr lang="en-US" dirty="0"/>
+          </a:p>
+        </p:txBody>
+      </p:sp>
+    </p:spTree>
+    <p:extLst>
+      <p:ext uri="{BB962C8B-B14F-4D97-AF65-F5344CB8AC3E}">
+        <p14:creationId xmlns:p14="http://schemas.microsoft.com/office/powerpoint/2010/main" val="3915264646"/>
+      </p:ext>
+    </p:extLst>
+  </p:cSld>
+  <p:clrMapOvr>
+    <a:masterClrMapping/>
+  </p:clrMapOvr>
+</p:sld>
+</file>
+
 <file path=ppt/slides/slide6.xml><?xml version="1.0" encoding="utf-8"?>
 <p:sld xmlns:a="http://schemas.openxmlformats.org/drawingml/2006/main" xmlns:r="http://schemas.openxmlformats.org/officeDocument/2006/relationships" xmlns:p="http://schemas.openxmlformats.org/presentationml/2006/main">
   <p:cSld>
@@ -4252,12 +4315,83 @@
           <a:chExt cx="0" cy="0"/>
         </a:xfrm>
       </p:grpSpPr>
-      <p:sp>
-        <p:nvSpPr>
-          <p:cNvPr id="4" name="Title 3">
-            <a:extLst>
-              <a:ext uri="{FF2B5EF4-FFF2-40B4-BE49-F238E27FC236}">
-                <a16:creationId xmlns:a16="http://schemas.microsoft.com/office/drawing/2014/main" id="{3C0B0A9A-2705-4AA3-9255-5BD4A8B31D95}"/>
+      <p:pic>
+        <p:nvPicPr>
+          <p:cNvPr id="9" name="Content Placeholder 8">
+            <a:extLst>
+              <a:ext uri="{FF2B5EF4-FFF2-40B4-BE49-F238E27FC236}">
+                <a16:creationId xmlns:a16="http://schemas.microsoft.com/office/drawing/2014/main" id="{4F9DBA09-0B20-435D-9EA9-DB0C65B3FA73}"/>
+              </a:ext>
+            </a:extLst>
+          </p:cNvPr>
+          <p:cNvPicPr>
+            <a:picLocks noGrp="1" noChangeAspect="1"/>
+          </p:cNvPicPr>
+          <p:nvPr>
+            <p:ph idx="1"/>
+          </p:nvPr>
+        </p:nvPicPr>
+        <p:blipFill>
+          <a:blip r:embed="rId2">
+            <a:extLst>
+              <a:ext uri="{28A0092B-C50C-407E-A947-70E740481C1C}">
+                <a14:useLocalDpi xmlns:a14="http://schemas.microsoft.com/office/drawing/2010/main" val="0"/>
+              </a:ext>
+            </a:extLst>
+          </a:blip>
+          <a:stretch>
+            <a:fillRect/>
+          </a:stretch>
+        </p:blipFill>
+        <p:spPr>
+          <a:xfrm>
+            <a:off x="710609" y="1690688"/>
+            <a:ext cx="5066192" cy="2849526"/>
+          </a:xfrm>
+        </p:spPr>
+      </p:pic>
+      <p:pic>
+        <p:nvPicPr>
+          <p:cNvPr id="11" name="Picture 10">
+            <a:extLst>
+              <a:ext uri="{FF2B5EF4-FFF2-40B4-BE49-F238E27FC236}">
+                <a16:creationId xmlns:a16="http://schemas.microsoft.com/office/drawing/2014/main" id="{7B7B59B1-F0BF-4B8B-8C4E-62938D1952F4}"/>
+              </a:ext>
+            </a:extLst>
+          </p:cNvPr>
+          <p:cNvPicPr>
+            <a:picLocks noChangeAspect="1"/>
+          </p:cNvPicPr>
+          <p:nvPr/>
+        </p:nvPicPr>
+        <p:blipFill>
+          <a:blip r:embed="rId3">
+            <a:extLst>
+              <a:ext uri="{28A0092B-C50C-407E-A947-70E740481C1C}">
+                <a14:useLocalDpi xmlns:a14="http://schemas.microsoft.com/office/drawing/2010/main" val="0"/>
+              </a:ext>
+            </a:extLst>
+          </a:blip>
+          <a:stretch>
+            <a:fillRect/>
+          </a:stretch>
+        </p:blipFill>
+        <p:spPr>
+          <a:xfrm>
+            <a:off x="5883349" y="2817776"/>
+            <a:ext cx="6128673" cy="3444875"/>
+          </a:xfrm>
+          <a:prstGeom prst="rect">
+            <a:avLst/>
+          </a:prstGeom>
+        </p:spPr>
+      </p:pic>
+      <p:sp>
+        <p:nvSpPr>
+          <p:cNvPr id="13" name="Title 3">
+            <a:extLst>
+              <a:ext uri="{FF2B5EF4-FFF2-40B4-BE49-F238E27FC236}">
+                <a16:creationId xmlns:a16="http://schemas.microsoft.com/office/drawing/2014/main" id="{560DF37B-5A27-4B42-B2DD-C013438EEEA3}"/>
               </a:ext>
             </a:extLst>
           </p:cNvPr>
@@ -4268,7 +4402,12 @@
             <p:ph type="title"/>
           </p:nvPr>
         </p:nvSpPr>
-        <p:spPr/>
+        <p:spPr>
+          <a:xfrm>
+            <a:off x="838200" y="365125"/>
+            <a:ext cx="10515600" cy="1325563"/>
+          </a:xfrm>
+        </p:spPr>
         <p:txBody>
           <a:bodyPr/>
           <a:lstStyle/>
@@ -4282,150 +4421,15 @@
             </a:br>
             <a:r>
               <a:rPr lang="en-US" dirty="0"/>
-              <a:t>Using Folium </a:t>
-            </a:r>
-          </a:p>
-        </p:txBody>
-      </p:sp>
-      <p:sp>
-        <p:nvSpPr>
-          <p:cNvPr id="8" name="Content Placeholder 4">
-            <a:extLst>
-              <a:ext uri="{FF2B5EF4-FFF2-40B4-BE49-F238E27FC236}">
-                <a16:creationId xmlns:a16="http://schemas.microsoft.com/office/drawing/2014/main" id="{A4ED4195-C0DD-4DB3-B7B1-A753E90C2BA7}"/>
-              </a:ext>
-            </a:extLst>
-          </p:cNvPr>
-          <p:cNvSpPr>
-            <a:spLocks noGrp="1"/>
-          </p:cNvSpPr>
-          <p:nvPr>
-            <p:ph idx="1"/>
-          </p:nvPr>
-        </p:nvSpPr>
-        <p:spPr>
-          <a:xfrm>
-            <a:off x="653561" y="1588232"/>
-            <a:ext cx="10515600" cy="4351338"/>
-          </a:xfrm>
-        </p:spPr>
-        <p:txBody>
-          <a:bodyPr>
-            <a:normAutofit/>
-          </a:bodyPr>
-          <a:lstStyle/>
-          <a:p>
-            <a:r>
-              <a:rPr lang="en-US" dirty="0"/>
-              <a:t>Appeal</a:t>
-            </a:r>
-          </a:p>
-          <a:p>
-            <a:pPr lvl="1"/>
-            <a:r>
-              <a:rPr lang="en-US" dirty="0"/>
-              <a:t>Easy to quickly plot &amp; cluster any </a:t>
-            </a:r>
-            <a:r>
-              <a:rPr lang="en-US" dirty="0" err="1"/>
-              <a:t>lat</a:t>
-            </a:r>
-            <a:r>
-              <a:rPr lang="en-US" dirty="0"/>
-              <a:t>/</a:t>
-            </a:r>
-            <a:r>
-              <a:rPr lang="en-US" dirty="0" err="1"/>
-              <a:t>lon</a:t>
-            </a:r>
-            <a:r>
-              <a:rPr lang="en-US" dirty="0"/>
-              <a:t> data</a:t>
-            </a:r>
-          </a:p>
-          <a:p>
-            <a:pPr lvl="1"/>
-            <a:r>
-              <a:rPr lang="en-US" dirty="0"/>
-              <a:t>Seems to work with shape files or </a:t>
-            </a:r>
-            <a:r>
-              <a:rPr lang="en-US" dirty="0" err="1"/>
-              <a:t>choropeth</a:t>
-            </a:r>
-            <a:r>
-              <a:rPr lang="en-US" dirty="0"/>
-              <a:t> mapping </a:t>
-            </a:r>
-          </a:p>
-          <a:p>
-            <a:pPr lvl="1"/>
-            <a:r>
-              <a:rPr lang="en-US" dirty="0"/>
-              <a:t>Lots of flexibility on map appearance and 3</a:t>
-            </a:r>
-            <a:r>
-              <a:rPr lang="en-US" baseline="30000" dirty="0"/>
-              <a:t>rd</a:t>
-            </a:r>
-            <a:r>
-              <a:rPr lang="en-US" dirty="0"/>
-              <a:t> party plug-ins</a:t>
-            </a:r>
-          </a:p>
-          <a:p>
-            <a:pPr lvl="1"/>
-            <a:r>
-              <a:rPr lang="en-US" dirty="0"/>
-              <a:t>Builds on top of </a:t>
-            </a:r>
-            <a:r>
-              <a:rPr lang="en-US" dirty="0" err="1"/>
-              <a:t>Leafly</a:t>
-            </a:r>
-            <a:r>
-              <a:rPr lang="en-US" dirty="0"/>
-              <a:t>, so includes many of it’s capabilities?</a:t>
-            </a:r>
-          </a:p>
-          <a:p>
-            <a:r>
-              <a:rPr lang="en-US" dirty="0"/>
-              <a:t>Drawbacks</a:t>
-            </a:r>
-          </a:p>
-          <a:p>
-            <a:pPr lvl="1"/>
-            <a:r>
-              <a:rPr lang="en-US" dirty="0"/>
-              <a:t>Not as easy to make interactive dashboards as </a:t>
-            </a:r>
-            <a:r>
-              <a:rPr lang="en-US" dirty="0" err="1"/>
-              <a:t>plotly</a:t>
-            </a:r>
-            <a:r>
-              <a:rPr lang="en-US" dirty="0"/>
-              <a:t>?</a:t>
-            </a:r>
-          </a:p>
-          <a:p>
-            <a:pPr lvl="1"/>
-            <a:r>
-              <a:rPr lang="en-US" dirty="0"/>
-              <a:t>Adding &gt;1000 markers seems slow (there may be a plugin to fix this?)</a:t>
-            </a:r>
-          </a:p>
-          <a:p>
-            <a:pPr lvl="1"/>
-            <a:endParaRPr lang="en-US" dirty="0"/>
+              <a:t>Project Maintenance</a:t>
+            </a:r>
           </a:p>
         </p:txBody>
       </p:sp>
     </p:spTree>
     <p:extLst>
       <p:ext uri="{BB962C8B-B14F-4D97-AF65-F5344CB8AC3E}">
-        <p14:creationId xmlns:p14="http://schemas.microsoft.com/office/powerpoint/2010/main" val="3915264646"/>
+        <p14:creationId xmlns:p14="http://schemas.microsoft.com/office/powerpoint/2010/main" val="2891915450"/>
       </p:ext>
     </p:extLst>
   </p:cSld>

</xml_diff>

<commit_message>
updating the technology review
</commit_message>
<xml_diff>
--- a/doc/Technology_Review_Presentation.pptx
+++ b/doc/Technology_Review_Presentation.pptx
@@ -4,13 +4,18 @@
   <p:sldMasterIdLst>
     <p:sldMasterId id="2147483648" r:id="rId1"/>
   </p:sldMasterIdLst>
+  <p:notesMasterIdLst>
+    <p:notesMasterId r:id="rId10"/>
+  </p:notesMasterIdLst>
   <p:sldIdLst>
     <p:sldId id="258" r:id="rId2"/>
     <p:sldId id="256" r:id="rId3"/>
     <p:sldId id="257" r:id="rId4"/>
     <p:sldId id="260" r:id="rId5"/>
     <p:sldId id="261" r:id="rId6"/>
-    <p:sldId id="263" r:id="rId7"/>
+    <p:sldId id="265" r:id="rId7"/>
+    <p:sldId id="263" r:id="rId8"/>
+    <p:sldId id="264" r:id="rId9"/>
   </p:sldIdLst>
   <p:sldSz cx="12192000" cy="6858000"/>
   <p:notesSz cx="6858000" cy="9144000"/>
@@ -206,6 +211,1055 @@
     </pc:docChg>
   </pc:docChgLst>
 </pc:chgInfo>
+</file>
+
+<file path=ppt/notesMasters/notesMaster1.xml><?xml version="1.0" encoding="utf-8"?>
+<p:notesMaster xmlns:a="http://schemas.openxmlformats.org/drawingml/2006/main" xmlns:r="http://schemas.openxmlformats.org/officeDocument/2006/relationships" xmlns:p="http://schemas.openxmlformats.org/presentationml/2006/main">
+  <p:cSld>
+    <p:bg>
+      <p:bgRef idx="1001">
+        <a:schemeClr val="bg1"/>
+      </p:bgRef>
+    </p:bg>
+    <p:spTree>
+      <p:nvGrpSpPr>
+        <p:cNvPr id="1" name=""/>
+        <p:cNvGrpSpPr/>
+        <p:nvPr/>
+      </p:nvGrpSpPr>
+      <p:grpSpPr>
+        <a:xfrm>
+          <a:off x="0" y="0"/>
+          <a:ext cx="0" cy="0"/>
+          <a:chOff x="0" y="0"/>
+          <a:chExt cx="0" cy="0"/>
+        </a:xfrm>
+      </p:grpSpPr>
+      <p:sp>
+        <p:nvSpPr>
+          <p:cNvPr id="2" name="Header Placeholder 1"/>
+          <p:cNvSpPr>
+            <a:spLocks noGrp="1"/>
+          </p:cNvSpPr>
+          <p:nvPr>
+            <p:ph type="hdr" sz="quarter"/>
+          </p:nvPr>
+        </p:nvSpPr>
+        <p:spPr>
+          <a:xfrm>
+            <a:off x="0" y="0"/>
+            <a:ext cx="2971800" cy="458788"/>
+          </a:xfrm>
+          <a:prstGeom prst="rect">
+            <a:avLst/>
+          </a:prstGeom>
+        </p:spPr>
+        <p:txBody>
+          <a:bodyPr vert="horz" lIns="91440" tIns="45720" rIns="91440" bIns="45720" rtlCol="0"/>
+          <a:lstStyle>
+            <a:lvl1pPr algn="l">
+              <a:defRPr sz="1200"/>
+            </a:lvl1pPr>
+          </a:lstStyle>
+          <a:p>
+            <a:endParaRPr lang="en-US"/>
+          </a:p>
+        </p:txBody>
+      </p:sp>
+      <p:sp>
+        <p:nvSpPr>
+          <p:cNvPr id="3" name="Date Placeholder 2"/>
+          <p:cNvSpPr>
+            <a:spLocks noGrp="1"/>
+          </p:cNvSpPr>
+          <p:nvPr>
+            <p:ph type="dt" idx="1"/>
+          </p:nvPr>
+        </p:nvSpPr>
+        <p:spPr>
+          <a:xfrm>
+            <a:off x="3884613" y="0"/>
+            <a:ext cx="2971800" cy="458788"/>
+          </a:xfrm>
+          <a:prstGeom prst="rect">
+            <a:avLst/>
+          </a:prstGeom>
+        </p:spPr>
+        <p:txBody>
+          <a:bodyPr vert="horz" lIns="91440" tIns="45720" rIns="91440" bIns="45720" rtlCol="0"/>
+          <a:lstStyle>
+            <a:lvl1pPr algn="r">
+              <a:defRPr sz="1200"/>
+            </a:lvl1pPr>
+          </a:lstStyle>
+          <a:p>
+            <a:fld id="{35F6A2F1-FCFD-42AB-9A88-FE39BC022128}" type="datetimeFigureOut">
+              <a:rPr lang="en-US" smtClean="0"/>
+              <a:t>5/7/2018</a:t>
+            </a:fld>
+            <a:endParaRPr lang="en-US"/>
+          </a:p>
+        </p:txBody>
+      </p:sp>
+      <p:sp>
+        <p:nvSpPr>
+          <p:cNvPr id="4" name="Slide Image Placeholder 3"/>
+          <p:cNvSpPr>
+            <a:spLocks noGrp="1" noRot="1" noChangeAspect="1"/>
+          </p:cNvSpPr>
+          <p:nvPr>
+            <p:ph type="sldImg" idx="2"/>
+          </p:nvPr>
+        </p:nvSpPr>
+        <p:spPr>
+          <a:xfrm>
+            <a:off x="685800" y="1143000"/>
+            <a:ext cx="5486400" cy="3086100"/>
+          </a:xfrm>
+          <a:prstGeom prst="rect">
+            <a:avLst/>
+          </a:prstGeom>
+          <a:noFill/>
+          <a:ln w="12700">
+            <a:solidFill>
+              <a:prstClr val="black"/>
+            </a:solidFill>
+          </a:ln>
+        </p:spPr>
+        <p:txBody>
+          <a:bodyPr vert="horz" lIns="91440" tIns="45720" rIns="91440" bIns="45720" rtlCol="0" anchor="ctr"/>
+          <a:lstStyle/>
+          <a:p>
+            <a:endParaRPr lang="en-US"/>
+          </a:p>
+        </p:txBody>
+      </p:sp>
+      <p:sp>
+        <p:nvSpPr>
+          <p:cNvPr id="5" name="Notes Placeholder 4"/>
+          <p:cNvSpPr>
+            <a:spLocks noGrp="1"/>
+          </p:cNvSpPr>
+          <p:nvPr>
+            <p:ph type="body" sz="quarter" idx="3"/>
+          </p:nvPr>
+        </p:nvSpPr>
+        <p:spPr>
+          <a:xfrm>
+            <a:off x="685800" y="4400550"/>
+            <a:ext cx="5486400" cy="3600450"/>
+          </a:xfrm>
+          <a:prstGeom prst="rect">
+            <a:avLst/>
+          </a:prstGeom>
+        </p:spPr>
+        <p:txBody>
+          <a:bodyPr vert="horz" lIns="91440" tIns="45720" rIns="91440" bIns="45720" rtlCol="0"/>
+          <a:lstStyle/>
+          <a:p>
+            <a:pPr lvl="0"/>
+            <a:r>
+              <a:rPr lang="en-US"/>
+              <a:t>Edit Master text styles</a:t>
+            </a:r>
+          </a:p>
+          <a:p>
+            <a:pPr lvl="1"/>
+            <a:r>
+              <a:rPr lang="en-US"/>
+              <a:t>Second level</a:t>
+            </a:r>
+          </a:p>
+          <a:p>
+            <a:pPr lvl="2"/>
+            <a:r>
+              <a:rPr lang="en-US"/>
+              <a:t>Third level</a:t>
+            </a:r>
+          </a:p>
+          <a:p>
+            <a:pPr lvl="3"/>
+            <a:r>
+              <a:rPr lang="en-US"/>
+              <a:t>Fourth level</a:t>
+            </a:r>
+          </a:p>
+          <a:p>
+            <a:pPr lvl="4"/>
+            <a:r>
+              <a:rPr lang="en-US"/>
+              <a:t>Fifth level</a:t>
+            </a:r>
+          </a:p>
+        </p:txBody>
+      </p:sp>
+      <p:sp>
+        <p:nvSpPr>
+          <p:cNvPr id="6" name="Footer Placeholder 5"/>
+          <p:cNvSpPr>
+            <a:spLocks noGrp="1"/>
+          </p:cNvSpPr>
+          <p:nvPr>
+            <p:ph type="ftr" sz="quarter" idx="4"/>
+          </p:nvPr>
+        </p:nvSpPr>
+        <p:spPr>
+          <a:xfrm>
+            <a:off x="0" y="8685213"/>
+            <a:ext cx="2971800" cy="458787"/>
+          </a:xfrm>
+          <a:prstGeom prst="rect">
+            <a:avLst/>
+          </a:prstGeom>
+        </p:spPr>
+        <p:txBody>
+          <a:bodyPr vert="horz" lIns="91440" tIns="45720" rIns="91440" bIns="45720" rtlCol="0" anchor="b"/>
+          <a:lstStyle>
+            <a:lvl1pPr algn="l">
+              <a:defRPr sz="1200"/>
+            </a:lvl1pPr>
+          </a:lstStyle>
+          <a:p>
+            <a:endParaRPr lang="en-US"/>
+          </a:p>
+        </p:txBody>
+      </p:sp>
+      <p:sp>
+        <p:nvSpPr>
+          <p:cNvPr id="7" name="Slide Number Placeholder 6"/>
+          <p:cNvSpPr>
+            <a:spLocks noGrp="1"/>
+          </p:cNvSpPr>
+          <p:nvPr>
+            <p:ph type="sldNum" sz="quarter" idx="5"/>
+          </p:nvPr>
+        </p:nvSpPr>
+        <p:spPr>
+          <a:xfrm>
+            <a:off x="3884613" y="8685213"/>
+            <a:ext cx="2971800" cy="458787"/>
+          </a:xfrm>
+          <a:prstGeom prst="rect">
+            <a:avLst/>
+          </a:prstGeom>
+        </p:spPr>
+        <p:txBody>
+          <a:bodyPr vert="horz" lIns="91440" tIns="45720" rIns="91440" bIns="45720" rtlCol="0" anchor="b"/>
+          <a:lstStyle>
+            <a:lvl1pPr algn="r">
+              <a:defRPr sz="1200"/>
+            </a:lvl1pPr>
+          </a:lstStyle>
+          <a:p>
+            <a:fld id="{E67D8E48-E79C-46E6-AEA0-9F19B419B074}" type="slidenum">
+              <a:rPr lang="en-US" smtClean="0"/>
+              <a:t>‹#›</a:t>
+            </a:fld>
+            <a:endParaRPr lang="en-US"/>
+          </a:p>
+        </p:txBody>
+      </p:sp>
+    </p:spTree>
+    <p:extLst>
+      <p:ext uri="{BB962C8B-B14F-4D97-AF65-F5344CB8AC3E}">
+        <p14:creationId xmlns:p14="http://schemas.microsoft.com/office/powerpoint/2010/main" val="2541628379"/>
+      </p:ext>
+    </p:extLst>
+  </p:cSld>
+  <p:clrMap bg1="lt1" tx1="dk1" bg2="lt2" tx2="dk2" accent1="accent1" accent2="accent2" accent3="accent3" accent4="accent4" accent5="accent5" accent6="accent6" hlink="hlink" folHlink="folHlink"/>
+  <p:notesStyle>
+    <a:lvl1pPr marL="0" algn="l" defTabSz="914400" rtl="0" eaLnBrk="1" latinLnBrk="0" hangingPunct="1">
+      <a:defRPr sz="1200" kern="1200">
+        <a:solidFill>
+          <a:schemeClr val="tx1"/>
+        </a:solidFill>
+        <a:latin typeface="+mn-lt"/>
+        <a:ea typeface="+mn-ea"/>
+        <a:cs typeface="+mn-cs"/>
+      </a:defRPr>
+    </a:lvl1pPr>
+    <a:lvl2pPr marL="457200" algn="l" defTabSz="914400" rtl="0" eaLnBrk="1" latinLnBrk="0" hangingPunct="1">
+      <a:defRPr sz="1200" kern="1200">
+        <a:solidFill>
+          <a:schemeClr val="tx1"/>
+        </a:solidFill>
+        <a:latin typeface="+mn-lt"/>
+        <a:ea typeface="+mn-ea"/>
+        <a:cs typeface="+mn-cs"/>
+      </a:defRPr>
+    </a:lvl2pPr>
+    <a:lvl3pPr marL="914400" algn="l" defTabSz="914400" rtl="0" eaLnBrk="1" latinLnBrk="0" hangingPunct="1">
+      <a:defRPr sz="1200" kern="1200">
+        <a:solidFill>
+          <a:schemeClr val="tx1"/>
+        </a:solidFill>
+        <a:latin typeface="+mn-lt"/>
+        <a:ea typeface="+mn-ea"/>
+        <a:cs typeface="+mn-cs"/>
+      </a:defRPr>
+    </a:lvl3pPr>
+    <a:lvl4pPr marL="1371600" algn="l" defTabSz="914400" rtl="0" eaLnBrk="1" latinLnBrk="0" hangingPunct="1">
+      <a:defRPr sz="1200" kern="1200">
+        <a:solidFill>
+          <a:schemeClr val="tx1"/>
+        </a:solidFill>
+        <a:latin typeface="+mn-lt"/>
+        <a:ea typeface="+mn-ea"/>
+        <a:cs typeface="+mn-cs"/>
+      </a:defRPr>
+    </a:lvl4pPr>
+    <a:lvl5pPr marL="1828800" algn="l" defTabSz="914400" rtl="0" eaLnBrk="1" latinLnBrk="0" hangingPunct="1">
+      <a:defRPr sz="1200" kern="1200">
+        <a:solidFill>
+          <a:schemeClr val="tx1"/>
+        </a:solidFill>
+        <a:latin typeface="+mn-lt"/>
+        <a:ea typeface="+mn-ea"/>
+        <a:cs typeface="+mn-cs"/>
+      </a:defRPr>
+    </a:lvl5pPr>
+    <a:lvl6pPr marL="2286000" algn="l" defTabSz="914400" rtl="0" eaLnBrk="1" latinLnBrk="0" hangingPunct="1">
+      <a:defRPr sz="1200" kern="1200">
+        <a:solidFill>
+          <a:schemeClr val="tx1"/>
+        </a:solidFill>
+        <a:latin typeface="+mn-lt"/>
+        <a:ea typeface="+mn-ea"/>
+        <a:cs typeface="+mn-cs"/>
+      </a:defRPr>
+    </a:lvl6pPr>
+    <a:lvl7pPr marL="2743200" algn="l" defTabSz="914400" rtl="0" eaLnBrk="1" latinLnBrk="0" hangingPunct="1">
+      <a:defRPr sz="1200" kern="1200">
+        <a:solidFill>
+          <a:schemeClr val="tx1"/>
+        </a:solidFill>
+        <a:latin typeface="+mn-lt"/>
+        <a:ea typeface="+mn-ea"/>
+        <a:cs typeface="+mn-cs"/>
+      </a:defRPr>
+    </a:lvl7pPr>
+    <a:lvl8pPr marL="3200400" algn="l" defTabSz="914400" rtl="0" eaLnBrk="1" latinLnBrk="0" hangingPunct="1">
+      <a:defRPr sz="1200" kern="1200">
+        <a:solidFill>
+          <a:schemeClr val="tx1"/>
+        </a:solidFill>
+        <a:latin typeface="+mn-lt"/>
+        <a:ea typeface="+mn-ea"/>
+        <a:cs typeface="+mn-cs"/>
+      </a:defRPr>
+    </a:lvl8pPr>
+    <a:lvl9pPr marL="3657600" algn="l" defTabSz="914400" rtl="0" eaLnBrk="1" latinLnBrk="0" hangingPunct="1">
+      <a:defRPr sz="1200" kern="1200">
+        <a:solidFill>
+          <a:schemeClr val="tx1"/>
+        </a:solidFill>
+        <a:latin typeface="+mn-lt"/>
+        <a:ea typeface="+mn-ea"/>
+        <a:cs typeface="+mn-cs"/>
+      </a:defRPr>
+    </a:lvl9pPr>
+  </p:notesStyle>
+</p:notesMaster>
+</file>
+
+<file path=ppt/notesSlides/notesSlide1.xml><?xml version="1.0" encoding="utf-8"?>
+<p:notes xmlns:a="http://schemas.openxmlformats.org/drawingml/2006/main" xmlns:r="http://schemas.openxmlformats.org/officeDocument/2006/relationships" xmlns:p="http://schemas.openxmlformats.org/presentationml/2006/main">
+  <p:cSld>
+    <p:spTree>
+      <p:nvGrpSpPr>
+        <p:cNvPr id="1" name=""/>
+        <p:cNvGrpSpPr/>
+        <p:nvPr/>
+      </p:nvGrpSpPr>
+      <p:grpSpPr>
+        <a:xfrm>
+          <a:off x="0" y="0"/>
+          <a:ext cx="0" cy="0"/>
+          <a:chOff x="0" y="0"/>
+          <a:chExt cx="0" cy="0"/>
+        </a:xfrm>
+      </p:grpSpPr>
+      <p:sp>
+        <p:nvSpPr>
+          <p:cNvPr id="2" name="Slide Image Placeholder 1"/>
+          <p:cNvSpPr>
+            <a:spLocks noGrp="1" noRot="1" noChangeAspect="1"/>
+          </p:cNvSpPr>
+          <p:nvPr>
+            <p:ph type="sldImg"/>
+          </p:nvPr>
+        </p:nvSpPr>
+        <p:spPr/>
+      </p:sp>
+      <p:sp>
+        <p:nvSpPr>
+          <p:cNvPr id="3" name="Notes Placeholder 2"/>
+          <p:cNvSpPr>
+            <a:spLocks noGrp="1"/>
+          </p:cNvSpPr>
+          <p:nvPr>
+            <p:ph type="body" idx="1"/>
+          </p:nvPr>
+        </p:nvSpPr>
+        <p:spPr/>
+        <p:txBody>
+          <a:bodyPr/>
+          <a:lstStyle/>
+          <a:p>
+            <a:r>
+              <a:rPr lang="en-US" dirty="0" err="1"/>
+              <a:t>LIbby</a:t>
+            </a:r>
+            <a:endParaRPr lang="en-US" dirty="0"/>
+          </a:p>
+        </p:txBody>
+      </p:sp>
+      <p:sp>
+        <p:nvSpPr>
+          <p:cNvPr id="4" name="Slide Number Placeholder 3"/>
+          <p:cNvSpPr>
+            <a:spLocks noGrp="1"/>
+          </p:cNvSpPr>
+          <p:nvPr>
+            <p:ph type="sldNum" sz="quarter" idx="10"/>
+          </p:nvPr>
+        </p:nvSpPr>
+        <p:spPr/>
+        <p:txBody>
+          <a:bodyPr/>
+          <a:lstStyle/>
+          <a:p>
+            <a:fld id="{E67D8E48-E79C-46E6-AEA0-9F19B419B074}" type="slidenum">
+              <a:rPr lang="en-US" smtClean="0"/>
+              <a:t>1</a:t>
+            </a:fld>
+            <a:endParaRPr lang="en-US"/>
+          </a:p>
+        </p:txBody>
+      </p:sp>
+    </p:spTree>
+    <p:extLst>
+      <p:ext uri="{BB962C8B-B14F-4D97-AF65-F5344CB8AC3E}">
+        <p14:creationId xmlns:p14="http://schemas.microsoft.com/office/powerpoint/2010/main" val="2640912099"/>
+      </p:ext>
+    </p:extLst>
+  </p:cSld>
+  <p:clrMapOvr>
+    <a:masterClrMapping/>
+  </p:clrMapOvr>
+</p:notes>
+</file>
+
+<file path=ppt/notesSlides/notesSlide2.xml><?xml version="1.0" encoding="utf-8"?>
+<p:notes xmlns:a="http://schemas.openxmlformats.org/drawingml/2006/main" xmlns:r="http://schemas.openxmlformats.org/officeDocument/2006/relationships" xmlns:p="http://schemas.openxmlformats.org/presentationml/2006/main">
+  <p:cSld>
+    <p:spTree>
+      <p:nvGrpSpPr>
+        <p:cNvPr id="1" name=""/>
+        <p:cNvGrpSpPr/>
+        <p:nvPr/>
+      </p:nvGrpSpPr>
+      <p:grpSpPr>
+        <a:xfrm>
+          <a:off x="0" y="0"/>
+          <a:ext cx="0" cy="0"/>
+          <a:chOff x="0" y="0"/>
+          <a:chExt cx="0" cy="0"/>
+        </a:xfrm>
+      </p:grpSpPr>
+      <p:sp>
+        <p:nvSpPr>
+          <p:cNvPr id="2" name="Slide Image Placeholder 1"/>
+          <p:cNvSpPr>
+            <a:spLocks noGrp="1" noRot="1" noChangeAspect="1"/>
+          </p:cNvSpPr>
+          <p:nvPr>
+            <p:ph type="sldImg"/>
+          </p:nvPr>
+        </p:nvSpPr>
+        <p:spPr/>
+      </p:sp>
+      <p:sp>
+        <p:nvSpPr>
+          <p:cNvPr id="3" name="Notes Placeholder 2"/>
+          <p:cNvSpPr>
+            <a:spLocks noGrp="1"/>
+          </p:cNvSpPr>
+          <p:nvPr>
+            <p:ph type="body" idx="1"/>
+          </p:nvPr>
+        </p:nvSpPr>
+        <p:spPr/>
+        <p:txBody>
+          <a:bodyPr/>
+          <a:lstStyle/>
+          <a:p>
+            <a:r>
+              <a:rPr lang="en-US" dirty="0" err="1"/>
+              <a:t>LIbby</a:t>
+            </a:r>
+            <a:endParaRPr lang="en-US" dirty="0"/>
+          </a:p>
+        </p:txBody>
+      </p:sp>
+      <p:sp>
+        <p:nvSpPr>
+          <p:cNvPr id="4" name="Slide Number Placeholder 3"/>
+          <p:cNvSpPr>
+            <a:spLocks noGrp="1"/>
+          </p:cNvSpPr>
+          <p:nvPr>
+            <p:ph type="sldNum" sz="quarter" idx="10"/>
+          </p:nvPr>
+        </p:nvSpPr>
+        <p:spPr/>
+        <p:txBody>
+          <a:bodyPr/>
+          <a:lstStyle/>
+          <a:p>
+            <a:fld id="{E67D8E48-E79C-46E6-AEA0-9F19B419B074}" type="slidenum">
+              <a:rPr lang="en-US" smtClean="0"/>
+              <a:t>2</a:t>
+            </a:fld>
+            <a:endParaRPr lang="en-US"/>
+          </a:p>
+        </p:txBody>
+      </p:sp>
+    </p:spTree>
+    <p:extLst>
+      <p:ext uri="{BB962C8B-B14F-4D97-AF65-F5344CB8AC3E}">
+        <p14:creationId xmlns:p14="http://schemas.microsoft.com/office/powerpoint/2010/main" val="1515657491"/>
+      </p:ext>
+    </p:extLst>
+  </p:cSld>
+  <p:clrMapOvr>
+    <a:masterClrMapping/>
+  </p:clrMapOvr>
+</p:notes>
+</file>
+
+<file path=ppt/notesSlides/notesSlide3.xml><?xml version="1.0" encoding="utf-8"?>
+<p:notes xmlns:a="http://schemas.openxmlformats.org/drawingml/2006/main" xmlns:r="http://schemas.openxmlformats.org/officeDocument/2006/relationships" xmlns:p="http://schemas.openxmlformats.org/presentationml/2006/main">
+  <p:cSld>
+    <p:spTree>
+      <p:nvGrpSpPr>
+        <p:cNvPr id="1" name=""/>
+        <p:cNvGrpSpPr/>
+        <p:nvPr/>
+      </p:nvGrpSpPr>
+      <p:grpSpPr>
+        <a:xfrm>
+          <a:off x="0" y="0"/>
+          <a:ext cx="0" cy="0"/>
+          <a:chOff x="0" y="0"/>
+          <a:chExt cx="0" cy="0"/>
+        </a:xfrm>
+      </p:grpSpPr>
+      <p:sp>
+        <p:nvSpPr>
+          <p:cNvPr id="2" name="Slide Image Placeholder 1"/>
+          <p:cNvSpPr>
+            <a:spLocks noGrp="1" noRot="1" noChangeAspect="1"/>
+          </p:cNvSpPr>
+          <p:nvPr>
+            <p:ph type="sldImg"/>
+          </p:nvPr>
+        </p:nvSpPr>
+        <p:spPr/>
+      </p:sp>
+      <p:sp>
+        <p:nvSpPr>
+          <p:cNvPr id="3" name="Notes Placeholder 2"/>
+          <p:cNvSpPr>
+            <a:spLocks noGrp="1"/>
+          </p:cNvSpPr>
+          <p:nvPr>
+            <p:ph type="body" idx="1"/>
+          </p:nvPr>
+        </p:nvSpPr>
+        <p:spPr/>
+        <p:txBody>
+          <a:bodyPr/>
+          <a:lstStyle/>
+          <a:p>
+            <a:r>
+              <a:rPr lang="en-US" dirty="0"/>
+              <a:t>Libby</a:t>
+            </a:r>
+          </a:p>
+        </p:txBody>
+      </p:sp>
+      <p:sp>
+        <p:nvSpPr>
+          <p:cNvPr id="4" name="Slide Number Placeholder 3"/>
+          <p:cNvSpPr>
+            <a:spLocks noGrp="1"/>
+          </p:cNvSpPr>
+          <p:nvPr>
+            <p:ph type="sldNum" sz="quarter" idx="10"/>
+          </p:nvPr>
+        </p:nvSpPr>
+        <p:spPr/>
+        <p:txBody>
+          <a:bodyPr/>
+          <a:lstStyle/>
+          <a:p>
+            <a:fld id="{E67D8E48-E79C-46E6-AEA0-9F19B419B074}" type="slidenum">
+              <a:rPr lang="en-US" smtClean="0"/>
+              <a:t>3</a:t>
+            </a:fld>
+            <a:endParaRPr lang="en-US"/>
+          </a:p>
+        </p:txBody>
+      </p:sp>
+    </p:spTree>
+    <p:extLst>
+      <p:ext uri="{BB962C8B-B14F-4D97-AF65-F5344CB8AC3E}">
+        <p14:creationId xmlns:p14="http://schemas.microsoft.com/office/powerpoint/2010/main" val="1759336990"/>
+      </p:ext>
+    </p:extLst>
+  </p:cSld>
+  <p:clrMapOvr>
+    <a:masterClrMapping/>
+  </p:clrMapOvr>
+</p:notes>
+</file>
+
+<file path=ppt/notesSlides/notesSlide4.xml><?xml version="1.0" encoding="utf-8"?>
+<p:notes xmlns:a="http://schemas.openxmlformats.org/drawingml/2006/main" xmlns:r="http://schemas.openxmlformats.org/officeDocument/2006/relationships" xmlns:p="http://schemas.openxmlformats.org/presentationml/2006/main">
+  <p:cSld>
+    <p:spTree>
+      <p:nvGrpSpPr>
+        <p:cNvPr id="1" name=""/>
+        <p:cNvGrpSpPr/>
+        <p:nvPr/>
+      </p:nvGrpSpPr>
+      <p:grpSpPr>
+        <a:xfrm>
+          <a:off x="0" y="0"/>
+          <a:ext cx="0" cy="0"/>
+          <a:chOff x="0" y="0"/>
+          <a:chExt cx="0" cy="0"/>
+        </a:xfrm>
+      </p:grpSpPr>
+      <p:sp>
+        <p:nvSpPr>
+          <p:cNvPr id="2" name="Slide Image Placeholder 1"/>
+          <p:cNvSpPr>
+            <a:spLocks noGrp="1" noRot="1" noChangeAspect="1"/>
+          </p:cNvSpPr>
+          <p:nvPr>
+            <p:ph type="sldImg"/>
+          </p:nvPr>
+        </p:nvSpPr>
+        <p:spPr/>
+      </p:sp>
+      <p:sp>
+        <p:nvSpPr>
+          <p:cNvPr id="3" name="Notes Placeholder 2"/>
+          <p:cNvSpPr>
+            <a:spLocks noGrp="1"/>
+          </p:cNvSpPr>
+          <p:nvPr>
+            <p:ph type="body" idx="1"/>
+          </p:nvPr>
+        </p:nvSpPr>
+        <p:spPr/>
+        <p:txBody>
+          <a:bodyPr/>
+          <a:lstStyle/>
+          <a:p>
+            <a:r>
+              <a:rPr lang="en-US" dirty="0"/>
+              <a:t>Geoff</a:t>
+            </a:r>
+          </a:p>
+        </p:txBody>
+      </p:sp>
+      <p:sp>
+        <p:nvSpPr>
+          <p:cNvPr id="4" name="Slide Number Placeholder 3"/>
+          <p:cNvSpPr>
+            <a:spLocks noGrp="1"/>
+          </p:cNvSpPr>
+          <p:nvPr>
+            <p:ph type="sldNum" sz="quarter" idx="10"/>
+          </p:nvPr>
+        </p:nvSpPr>
+        <p:spPr/>
+        <p:txBody>
+          <a:bodyPr/>
+          <a:lstStyle/>
+          <a:p>
+            <a:fld id="{E67D8E48-E79C-46E6-AEA0-9F19B419B074}" type="slidenum">
+              <a:rPr lang="en-US" smtClean="0"/>
+              <a:t>4</a:t>
+            </a:fld>
+            <a:endParaRPr lang="en-US"/>
+          </a:p>
+        </p:txBody>
+      </p:sp>
+    </p:spTree>
+    <p:extLst>
+      <p:ext uri="{BB962C8B-B14F-4D97-AF65-F5344CB8AC3E}">
+        <p14:creationId xmlns:p14="http://schemas.microsoft.com/office/powerpoint/2010/main" val="2582184773"/>
+      </p:ext>
+    </p:extLst>
+  </p:cSld>
+  <p:clrMapOvr>
+    <a:masterClrMapping/>
+  </p:clrMapOvr>
+</p:notes>
+</file>
+
+<file path=ppt/notesSlides/notesSlide5.xml><?xml version="1.0" encoding="utf-8"?>
+<p:notes xmlns:a="http://schemas.openxmlformats.org/drawingml/2006/main" xmlns:r="http://schemas.openxmlformats.org/officeDocument/2006/relationships" xmlns:p="http://schemas.openxmlformats.org/presentationml/2006/main">
+  <p:cSld>
+    <p:spTree>
+      <p:nvGrpSpPr>
+        <p:cNvPr id="1" name=""/>
+        <p:cNvGrpSpPr/>
+        <p:nvPr/>
+      </p:nvGrpSpPr>
+      <p:grpSpPr>
+        <a:xfrm>
+          <a:off x="0" y="0"/>
+          <a:ext cx="0" cy="0"/>
+          <a:chOff x="0" y="0"/>
+          <a:chExt cx="0" cy="0"/>
+        </a:xfrm>
+      </p:grpSpPr>
+      <p:sp>
+        <p:nvSpPr>
+          <p:cNvPr id="2" name="Slide Image Placeholder 1"/>
+          <p:cNvSpPr>
+            <a:spLocks noGrp="1" noRot="1" noChangeAspect="1"/>
+          </p:cNvSpPr>
+          <p:nvPr>
+            <p:ph type="sldImg"/>
+          </p:nvPr>
+        </p:nvSpPr>
+        <p:spPr/>
+      </p:sp>
+      <p:sp>
+        <p:nvSpPr>
+          <p:cNvPr id="3" name="Notes Placeholder 2"/>
+          <p:cNvSpPr>
+            <a:spLocks noGrp="1"/>
+          </p:cNvSpPr>
+          <p:nvPr>
+            <p:ph type="body" idx="1"/>
+          </p:nvPr>
+        </p:nvSpPr>
+        <p:spPr/>
+        <p:txBody>
+          <a:bodyPr/>
+          <a:lstStyle/>
+          <a:p>
+            <a:r>
+              <a:rPr lang="en-US" dirty="0"/>
+              <a:t>Fei</a:t>
+            </a:r>
+          </a:p>
+        </p:txBody>
+      </p:sp>
+      <p:sp>
+        <p:nvSpPr>
+          <p:cNvPr id="4" name="Slide Number Placeholder 3"/>
+          <p:cNvSpPr>
+            <a:spLocks noGrp="1"/>
+          </p:cNvSpPr>
+          <p:nvPr>
+            <p:ph type="sldNum" sz="quarter" idx="10"/>
+          </p:nvPr>
+        </p:nvSpPr>
+        <p:spPr/>
+        <p:txBody>
+          <a:bodyPr/>
+          <a:lstStyle/>
+          <a:p>
+            <a:fld id="{E67D8E48-E79C-46E6-AEA0-9F19B419B074}" type="slidenum">
+              <a:rPr lang="en-US" smtClean="0"/>
+              <a:t>5</a:t>
+            </a:fld>
+            <a:endParaRPr lang="en-US"/>
+          </a:p>
+        </p:txBody>
+      </p:sp>
+    </p:spTree>
+    <p:extLst>
+      <p:ext uri="{BB962C8B-B14F-4D97-AF65-F5344CB8AC3E}">
+        <p14:creationId xmlns:p14="http://schemas.microsoft.com/office/powerpoint/2010/main" val="749704562"/>
+      </p:ext>
+    </p:extLst>
+  </p:cSld>
+  <p:clrMapOvr>
+    <a:masterClrMapping/>
+  </p:clrMapOvr>
+</p:notes>
+</file>
+
+<file path=ppt/notesSlides/notesSlide6.xml><?xml version="1.0" encoding="utf-8"?>
+<p:notes xmlns:a="http://schemas.openxmlformats.org/drawingml/2006/main" xmlns:r="http://schemas.openxmlformats.org/officeDocument/2006/relationships" xmlns:p="http://schemas.openxmlformats.org/presentationml/2006/main">
+  <p:cSld>
+    <p:spTree>
+      <p:nvGrpSpPr>
+        <p:cNvPr id="1" name=""/>
+        <p:cNvGrpSpPr/>
+        <p:nvPr/>
+      </p:nvGrpSpPr>
+      <p:grpSpPr>
+        <a:xfrm>
+          <a:off x="0" y="0"/>
+          <a:ext cx="0" cy="0"/>
+          <a:chOff x="0" y="0"/>
+          <a:chExt cx="0" cy="0"/>
+        </a:xfrm>
+      </p:grpSpPr>
+      <p:sp>
+        <p:nvSpPr>
+          <p:cNvPr id="2" name="Slide Image Placeholder 1"/>
+          <p:cNvSpPr>
+            <a:spLocks noGrp="1" noRot="1" noChangeAspect="1"/>
+          </p:cNvSpPr>
+          <p:nvPr>
+            <p:ph type="sldImg"/>
+          </p:nvPr>
+        </p:nvSpPr>
+        <p:spPr/>
+      </p:sp>
+      <p:sp>
+        <p:nvSpPr>
+          <p:cNvPr id="3" name="Notes Placeholder 2"/>
+          <p:cNvSpPr>
+            <a:spLocks noGrp="1"/>
+          </p:cNvSpPr>
+          <p:nvPr>
+            <p:ph type="body" idx="1"/>
+          </p:nvPr>
+        </p:nvSpPr>
+        <p:spPr/>
+        <p:txBody>
+          <a:bodyPr/>
+          <a:lstStyle/>
+          <a:p>
+            <a:r>
+              <a:rPr lang="en-US" dirty="0" err="1"/>
+              <a:t>Salik</a:t>
+            </a:r>
+            <a:endParaRPr lang="en-US" dirty="0"/>
+          </a:p>
+        </p:txBody>
+      </p:sp>
+      <p:sp>
+        <p:nvSpPr>
+          <p:cNvPr id="4" name="Slide Number Placeholder 3"/>
+          <p:cNvSpPr>
+            <a:spLocks noGrp="1"/>
+          </p:cNvSpPr>
+          <p:nvPr>
+            <p:ph type="sldNum" sz="quarter" idx="10"/>
+          </p:nvPr>
+        </p:nvSpPr>
+        <p:spPr/>
+        <p:txBody>
+          <a:bodyPr/>
+          <a:lstStyle/>
+          <a:p>
+            <a:fld id="{E67D8E48-E79C-46E6-AEA0-9F19B419B074}" type="slidenum">
+              <a:rPr lang="en-US" smtClean="0"/>
+              <a:t>6</a:t>
+            </a:fld>
+            <a:endParaRPr lang="en-US"/>
+          </a:p>
+        </p:txBody>
+      </p:sp>
+    </p:spTree>
+    <p:extLst>
+      <p:ext uri="{BB962C8B-B14F-4D97-AF65-F5344CB8AC3E}">
+        <p14:creationId xmlns:p14="http://schemas.microsoft.com/office/powerpoint/2010/main" val="4115800761"/>
+      </p:ext>
+    </p:extLst>
+  </p:cSld>
+  <p:clrMapOvr>
+    <a:masterClrMapping/>
+  </p:clrMapOvr>
+</p:notes>
+</file>
+
+<file path=ppt/notesSlides/notesSlide7.xml><?xml version="1.0" encoding="utf-8"?>
+<p:notes xmlns:a="http://schemas.openxmlformats.org/drawingml/2006/main" xmlns:r="http://schemas.openxmlformats.org/officeDocument/2006/relationships" xmlns:p="http://schemas.openxmlformats.org/presentationml/2006/main">
+  <p:cSld>
+    <p:spTree>
+      <p:nvGrpSpPr>
+        <p:cNvPr id="1" name=""/>
+        <p:cNvGrpSpPr/>
+        <p:nvPr/>
+      </p:nvGrpSpPr>
+      <p:grpSpPr>
+        <a:xfrm>
+          <a:off x="0" y="0"/>
+          <a:ext cx="0" cy="0"/>
+          <a:chOff x="0" y="0"/>
+          <a:chExt cx="0" cy="0"/>
+        </a:xfrm>
+      </p:grpSpPr>
+      <p:sp>
+        <p:nvSpPr>
+          <p:cNvPr id="2" name="Slide Image Placeholder 1"/>
+          <p:cNvSpPr>
+            <a:spLocks noGrp="1" noRot="1" noChangeAspect="1"/>
+          </p:cNvSpPr>
+          <p:nvPr>
+            <p:ph type="sldImg"/>
+          </p:nvPr>
+        </p:nvSpPr>
+        <p:spPr/>
+      </p:sp>
+      <p:sp>
+        <p:nvSpPr>
+          <p:cNvPr id="3" name="Notes Placeholder 2"/>
+          <p:cNvSpPr>
+            <a:spLocks noGrp="1"/>
+          </p:cNvSpPr>
+          <p:nvPr>
+            <p:ph type="body" idx="1"/>
+          </p:nvPr>
+        </p:nvSpPr>
+        <p:spPr/>
+        <p:txBody>
+          <a:bodyPr/>
+          <a:lstStyle/>
+          <a:p>
+            <a:r>
+              <a:rPr lang="en-US" dirty="0" err="1"/>
+              <a:t>Salik</a:t>
+            </a:r>
+            <a:endParaRPr lang="en-US" dirty="0"/>
+          </a:p>
+        </p:txBody>
+      </p:sp>
+      <p:sp>
+        <p:nvSpPr>
+          <p:cNvPr id="4" name="Slide Number Placeholder 3"/>
+          <p:cNvSpPr>
+            <a:spLocks noGrp="1"/>
+          </p:cNvSpPr>
+          <p:nvPr>
+            <p:ph type="sldNum" sz="quarter" idx="10"/>
+          </p:nvPr>
+        </p:nvSpPr>
+        <p:spPr/>
+        <p:txBody>
+          <a:bodyPr/>
+          <a:lstStyle/>
+          <a:p>
+            <a:fld id="{E67D8E48-E79C-46E6-AEA0-9F19B419B074}" type="slidenum">
+              <a:rPr lang="en-US" smtClean="0"/>
+              <a:t>7</a:t>
+            </a:fld>
+            <a:endParaRPr lang="en-US"/>
+          </a:p>
+        </p:txBody>
+      </p:sp>
+    </p:spTree>
+    <p:extLst>
+      <p:ext uri="{BB962C8B-B14F-4D97-AF65-F5344CB8AC3E}">
+        <p14:creationId xmlns:p14="http://schemas.microsoft.com/office/powerpoint/2010/main" val="986641159"/>
+      </p:ext>
+    </p:extLst>
+  </p:cSld>
+  <p:clrMapOvr>
+    <a:masterClrMapping/>
+  </p:clrMapOvr>
+</p:notes>
+</file>
+
+<file path=ppt/notesSlides/notesSlide8.xml><?xml version="1.0" encoding="utf-8"?>
+<p:notes xmlns:a="http://schemas.openxmlformats.org/drawingml/2006/main" xmlns:r="http://schemas.openxmlformats.org/officeDocument/2006/relationships" xmlns:p="http://schemas.openxmlformats.org/presentationml/2006/main">
+  <p:cSld>
+    <p:spTree>
+      <p:nvGrpSpPr>
+        <p:cNvPr id="1" name=""/>
+        <p:cNvGrpSpPr/>
+        <p:nvPr/>
+      </p:nvGrpSpPr>
+      <p:grpSpPr>
+        <a:xfrm>
+          <a:off x="0" y="0"/>
+          <a:ext cx="0" cy="0"/>
+          <a:chOff x="0" y="0"/>
+          <a:chExt cx="0" cy="0"/>
+        </a:xfrm>
+      </p:grpSpPr>
+      <p:sp>
+        <p:nvSpPr>
+          <p:cNvPr id="2" name="Slide Image Placeholder 1"/>
+          <p:cNvSpPr>
+            <a:spLocks noGrp="1" noRot="1" noChangeAspect="1"/>
+          </p:cNvSpPr>
+          <p:nvPr>
+            <p:ph type="sldImg"/>
+          </p:nvPr>
+        </p:nvSpPr>
+        <p:spPr/>
+      </p:sp>
+      <p:sp>
+        <p:nvSpPr>
+          <p:cNvPr id="3" name="Notes Placeholder 2"/>
+          <p:cNvSpPr>
+            <a:spLocks noGrp="1"/>
+          </p:cNvSpPr>
+          <p:nvPr>
+            <p:ph type="body" idx="1"/>
+          </p:nvPr>
+        </p:nvSpPr>
+        <p:spPr/>
+        <p:txBody>
+          <a:bodyPr/>
+          <a:lstStyle/>
+          <a:p>
+            <a:r>
+              <a:rPr lang="en-US" dirty="0"/>
+              <a:t>Libby </a:t>
+            </a:r>
+          </a:p>
+        </p:txBody>
+      </p:sp>
+      <p:sp>
+        <p:nvSpPr>
+          <p:cNvPr id="4" name="Slide Number Placeholder 3"/>
+          <p:cNvSpPr>
+            <a:spLocks noGrp="1"/>
+          </p:cNvSpPr>
+          <p:nvPr>
+            <p:ph type="sldNum" sz="quarter" idx="10"/>
+          </p:nvPr>
+        </p:nvSpPr>
+        <p:spPr/>
+        <p:txBody>
+          <a:bodyPr/>
+          <a:lstStyle/>
+          <a:p>
+            <a:fld id="{E67D8E48-E79C-46E6-AEA0-9F19B419B074}" type="slidenum">
+              <a:rPr lang="en-US" smtClean="0"/>
+              <a:t>8</a:t>
+            </a:fld>
+            <a:endParaRPr lang="en-US"/>
+          </a:p>
+        </p:txBody>
+      </p:sp>
+    </p:spTree>
+    <p:extLst>
+      <p:ext uri="{BB962C8B-B14F-4D97-AF65-F5344CB8AC3E}">
+        <p14:creationId xmlns:p14="http://schemas.microsoft.com/office/powerpoint/2010/main" val="384271175"/>
+      </p:ext>
+    </p:extLst>
+  </p:cSld>
+  <p:clrMapOvr>
+    <a:masterClrMapping/>
+  </p:clrMapOvr>
+</p:notes>
 </file>
 
 <file path=ppt/slideLayouts/slideLayout1.xml><?xml version="1.0" encoding="utf-8"?>
@@ -4013,7 +5067,7 @@
           <p:nvPr/>
         </p:nvPicPr>
         <p:blipFill>
-          <a:blip r:embed="rId2"/>
+          <a:blip r:embed="rId3"/>
           <a:stretch>
             <a:fillRect/>
           </a:stretch>
@@ -4315,6 +5369,89 @@
           <a:chExt cx="0" cy="0"/>
         </a:xfrm>
       </p:grpSpPr>
+      <p:sp>
+        <p:nvSpPr>
+          <p:cNvPr id="2" name="Title 1">
+            <a:extLst>
+              <a:ext uri="{FF2B5EF4-FFF2-40B4-BE49-F238E27FC236}">
+                <a16:creationId xmlns:a16="http://schemas.microsoft.com/office/drawing/2014/main" id="{415F9083-4AFA-4582-ACA1-80BBC8585D1F}"/>
+              </a:ext>
+            </a:extLst>
+          </p:cNvPr>
+          <p:cNvSpPr>
+            <a:spLocks noGrp="1"/>
+          </p:cNvSpPr>
+          <p:nvPr>
+            <p:ph type="title"/>
+          </p:nvPr>
+        </p:nvSpPr>
+        <p:spPr/>
+        <p:txBody>
+          <a:bodyPr/>
+          <a:lstStyle/>
+          <a:p>
+            <a:r>
+              <a:rPr lang="en-US" dirty="0"/>
+              <a:t>Dash Slides</a:t>
+            </a:r>
+          </a:p>
+        </p:txBody>
+      </p:sp>
+      <p:sp>
+        <p:nvSpPr>
+          <p:cNvPr id="3" name="Content Placeholder 2">
+            <a:extLst>
+              <a:ext uri="{FF2B5EF4-FFF2-40B4-BE49-F238E27FC236}">
+                <a16:creationId xmlns:a16="http://schemas.microsoft.com/office/drawing/2014/main" id="{2F62E126-287F-4D9E-AD41-8CA1D735247D}"/>
+              </a:ext>
+            </a:extLst>
+          </p:cNvPr>
+          <p:cNvSpPr>
+            <a:spLocks noGrp="1"/>
+          </p:cNvSpPr>
+          <p:nvPr>
+            <p:ph idx="1"/>
+          </p:nvPr>
+        </p:nvSpPr>
+        <p:spPr/>
+        <p:txBody>
+          <a:bodyPr/>
+          <a:lstStyle/>
+          <a:p>
+            <a:endParaRPr lang="en-US"/>
+          </a:p>
+        </p:txBody>
+      </p:sp>
+    </p:spTree>
+    <p:extLst>
+      <p:ext uri="{BB962C8B-B14F-4D97-AF65-F5344CB8AC3E}">
+        <p14:creationId xmlns:p14="http://schemas.microsoft.com/office/powerpoint/2010/main" val="1026264821"/>
+      </p:ext>
+    </p:extLst>
+  </p:cSld>
+  <p:clrMapOvr>
+    <a:masterClrMapping/>
+  </p:clrMapOvr>
+</p:sld>
+</file>
+
+<file path=ppt/slides/slide7.xml><?xml version="1.0" encoding="utf-8"?>
+<p:sld xmlns:a="http://schemas.openxmlformats.org/drawingml/2006/main" xmlns:r="http://schemas.openxmlformats.org/officeDocument/2006/relationships" xmlns:p="http://schemas.openxmlformats.org/presentationml/2006/main">
+  <p:cSld>
+    <p:spTree>
+      <p:nvGrpSpPr>
+        <p:cNvPr id="1" name=""/>
+        <p:cNvGrpSpPr/>
+        <p:nvPr/>
+      </p:nvGrpSpPr>
+      <p:grpSpPr>
+        <a:xfrm>
+          <a:off x="0" y="0"/>
+          <a:ext cx="0" cy="0"/>
+          <a:chOff x="0" y="0"/>
+          <a:chExt cx="0" cy="0"/>
+        </a:xfrm>
+      </p:grpSpPr>
       <p:pic>
         <p:nvPicPr>
           <p:cNvPr id="9" name="Content Placeholder 8">
@@ -4332,7 +5469,7 @@
           </p:nvPr>
         </p:nvPicPr>
         <p:blipFill>
-          <a:blip r:embed="rId2">
+          <a:blip r:embed="rId3">
             <a:extLst>
               <a:ext uri="{28A0092B-C50C-407E-A947-70E740481C1C}">
                 <a14:useLocalDpi xmlns:a14="http://schemas.microsoft.com/office/drawing/2010/main" val="0"/>
@@ -4365,7 +5502,7 @@
           <p:nvPr/>
         </p:nvPicPr>
         <p:blipFill>
-          <a:blip r:embed="rId3">
+          <a:blip r:embed="rId4">
             <a:extLst>
               <a:ext uri="{28A0092B-C50C-407E-A947-70E740481C1C}">
                 <a14:useLocalDpi xmlns:a14="http://schemas.microsoft.com/office/drawing/2010/main" val="0"/>
@@ -4430,6 +5567,170 @@
     <p:extLst>
       <p:ext uri="{BB962C8B-B14F-4D97-AF65-F5344CB8AC3E}">
         <p14:creationId xmlns:p14="http://schemas.microsoft.com/office/powerpoint/2010/main" val="2891915450"/>
+      </p:ext>
+    </p:extLst>
+  </p:cSld>
+  <p:clrMapOvr>
+    <a:masterClrMapping/>
+  </p:clrMapOvr>
+</p:sld>
+</file>
+
+<file path=ppt/slides/slide8.xml><?xml version="1.0" encoding="utf-8"?>
+<p:sld xmlns:a="http://schemas.openxmlformats.org/drawingml/2006/main" xmlns:r="http://schemas.openxmlformats.org/officeDocument/2006/relationships" xmlns:p="http://schemas.openxmlformats.org/presentationml/2006/main">
+  <p:cSld>
+    <p:spTree>
+      <p:nvGrpSpPr>
+        <p:cNvPr id="1" name=""/>
+        <p:cNvGrpSpPr/>
+        <p:nvPr/>
+      </p:nvGrpSpPr>
+      <p:grpSpPr>
+        <a:xfrm>
+          <a:off x="0" y="0"/>
+          <a:ext cx="0" cy="0"/>
+          <a:chOff x="0" y="0"/>
+          <a:chExt cx="0" cy="0"/>
+        </a:xfrm>
+      </p:grpSpPr>
+      <p:sp>
+        <p:nvSpPr>
+          <p:cNvPr id="2" name="Title 1">
+            <a:extLst>
+              <a:ext uri="{FF2B5EF4-FFF2-40B4-BE49-F238E27FC236}">
+                <a16:creationId xmlns:a16="http://schemas.microsoft.com/office/drawing/2014/main" id="{846E05E6-E4CC-40A8-9BE2-43B454D5AD97}"/>
+              </a:ext>
+            </a:extLst>
+          </p:cNvPr>
+          <p:cNvSpPr>
+            <a:spLocks noGrp="1"/>
+          </p:cNvSpPr>
+          <p:nvPr>
+            <p:ph type="title"/>
+          </p:nvPr>
+        </p:nvSpPr>
+        <p:spPr/>
+        <p:txBody>
+          <a:bodyPr/>
+          <a:lstStyle/>
+          <a:p>
+            <a:r>
+              <a:rPr lang="en-US" dirty="0"/>
+              <a:t>Other Packages Considered </a:t>
+            </a:r>
+          </a:p>
+        </p:txBody>
+      </p:sp>
+      <p:sp>
+        <p:nvSpPr>
+          <p:cNvPr id="3" name="Content Placeholder 2">
+            <a:extLst>
+              <a:ext uri="{FF2B5EF4-FFF2-40B4-BE49-F238E27FC236}">
+                <a16:creationId xmlns:a16="http://schemas.microsoft.com/office/drawing/2014/main" id="{43030AD3-CF3F-463F-B3DF-DA60FBA3379F}"/>
+              </a:ext>
+            </a:extLst>
+          </p:cNvPr>
+          <p:cNvSpPr>
+            <a:spLocks noGrp="1"/>
+          </p:cNvSpPr>
+          <p:nvPr>
+            <p:ph idx="1"/>
+          </p:nvPr>
+        </p:nvSpPr>
+        <p:spPr/>
+        <p:txBody>
+          <a:bodyPr/>
+          <a:lstStyle/>
+          <a:p>
+            <a:r>
+              <a:rPr lang="en-US" dirty="0">
+                <a:hlinkClick r:id="rId3"/>
+              </a:rPr>
+              <a:t>Django Web Widgets</a:t>
+            </a:r>
+            <a:r>
+              <a:rPr lang="en-US" dirty="0"/>
+              <a:t> </a:t>
+            </a:r>
+          </a:p>
+          <a:p>
+            <a:pPr lvl="1"/>
+            <a:r>
+              <a:rPr lang="en-US" dirty="0">
+                <a:hlinkClick r:id="rId4"/>
+              </a:rPr>
+              <a:t>Django</a:t>
+            </a:r>
+            <a:r>
+              <a:rPr lang="en-US" dirty="0"/>
+              <a:t> is a framework for creating webpages </a:t>
+            </a:r>
+          </a:p>
+          <a:p>
+            <a:pPr lvl="1"/>
+            <a:r>
+              <a:rPr lang="en-US" dirty="0"/>
+              <a:t>The examples all call the Google Maps API and do not appear to have </a:t>
+            </a:r>
+            <a:r>
+              <a:rPr lang="en-US" dirty="0">
+                <a:hlinkClick r:id="rId5"/>
+              </a:rPr>
+              <a:t>layering functionality</a:t>
+            </a:r>
+            <a:endParaRPr lang="en-US" dirty="0"/>
+          </a:p>
+          <a:p>
+            <a:pPr marL="0" indent="0">
+              <a:buNone/>
+            </a:pPr>
+            <a:endParaRPr lang="en-US" dirty="0">
+              <a:hlinkClick r:id="rId6"/>
+            </a:endParaRPr>
+          </a:p>
+          <a:p>
+            <a:r>
+              <a:rPr lang="en-US" dirty="0">
+                <a:hlinkClick r:id="rId6"/>
+              </a:rPr>
+              <a:t>Bokeh</a:t>
+            </a:r>
+            <a:endParaRPr lang="en-US" dirty="0"/>
+          </a:p>
+          <a:p>
+            <a:pPr lvl="1"/>
+            <a:r>
+              <a:rPr lang="en-US" dirty="0">
+                <a:hlinkClick r:id="rId7"/>
+              </a:rPr>
+              <a:t>Mapping types</a:t>
+            </a:r>
+            <a:r>
+              <a:rPr lang="en-US" dirty="0"/>
+              <a:t>: layers over google maps, tile maps, </a:t>
+            </a:r>
+            <a:r>
+              <a:rPr lang="en-US" dirty="0" err="1"/>
+              <a:t>GeoJSON</a:t>
+            </a:r>
+            <a:r>
+              <a:rPr lang="en-US" dirty="0"/>
+              <a:t> </a:t>
+            </a:r>
+          </a:p>
+          <a:p>
+            <a:pPr lvl="1"/>
+            <a:r>
+              <a:rPr lang="en-US" dirty="0"/>
+              <a:t>Support for mapping is limited</a:t>
+            </a:r>
+          </a:p>
+        </p:txBody>
+      </p:sp>
+    </p:spTree>
+    <p:extLst>
+      <p:ext uri="{BB962C8B-B14F-4D97-AF65-F5344CB8AC3E}">
+        <p14:creationId xmlns:p14="http://schemas.microsoft.com/office/powerpoint/2010/main" val="1534742074"/>
       </p:ext>
     </p:extLst>
   </p:cSld>
@@ -4732,4 +6033,299 @@
     </a:ext>
   </a:extLst>
 </a:theme>
+</file>
+
+<file path=ppt/theme/theme2.xml><?xml version="1.0" encoding="utf-8"?>
+<a:theme xmlns:a="http://schemas.openxmlformats.org/drawingml/2006/main" name="Office Theme">
+  <a:themeElements>
+    <a:clrScheme name="Office">
+      <a:dk1>
+        <a:sysClr val="windowText" lastClr="000000"/>
+      </a:dk1>
+      <a:lt1>
+        <a:sysClr val="window" lastClr="FFFFFF"/>
+      </a:lt1>
+      <a:dk2>
+        <a:srgbClr val="44546A"/>
+      </a:dk2>
+      <a:lt2>
+        <a:srgbClr val="E7E6E6"/>
+      </a:lt2>
+      <a:accent1>
+        <a:srgbClr val="4472C4"/>
+      </a:accent1>
+      <a:accent2>
+        <a:srgbClr val="ED7D31"/>
+      </a:accent2>
+      <a:accent3>
+        <a:srgbClr val="A5A5A5"/>
+      </a:accent3>
+      <a:accent4>
+        <a:srgbClr val="FFC000"/>
+      </a:accent4>
+      <a:accent5>
+        <a:srgbClr val="5B9BD5"/>
+      </a:accent5>
+      <a:accent6>
+        <a:srgbClr val="70AD47"/>
+      </a:accent6>
+      <a:hlink>
+        <a:srgbClr val="0563C1"/>
+      </a:hlink>
+      <a:folHlink>
+        <a:srgbClr val="954F72"/>
+      </a:folHlink>
+    </a:clrScheme>
+    <a:fontScheme name="Office">
+      <a:majorFont>
+        <a:latin typeface="Calibri Light" panose="020F0302020204030204"/>
+        <a:ea typeface=""/>
+        <a:cs typeface=""/>
+        <a:font script="Jpan" typeface="游ゴシック Light"/>
+        <a:font script="Hang" typeface="맑은 고딕"/>
+        <a:font script="Hans" typeface="等线 Light"/>
+        <a:font script="Hant" typeface="新細明體"/>
+        <a:font script="Arab" typeface="Times New Roman"/>
+        <a:font script="Hebr" typeface="Times New Roman"/>
+        <a:font script="Thai" typeface="Angsana New"/>
+        <a:font script="Ethi" typeface="Nyala"/>
+        <a:font script="Beng" typeface="Vrinda"/>
+        <a:font script="Gujr" typeface="Shruti"/>
+        <a:font script="Khmr" typeface="MoolBoran"/>
+        <a:font script="Knda" typeface="Tunga"/>
+        <a:font script="Guru" typeface="Raavi"/>
+        <a:font script="Cans" typeface="Euphemia"/>
+        <a:font script="Cher" typeface="Plantagenet Cherokee"/>
+        <a:font script="Yiii" typeface="Microsoft Yi Baiti"/>
+        <a:font script="Tibt" typeface="Microsoft Himalaya"/>
+        <a:font script="Thaa" typeface="MV Boli"/>
+        <a:font script="Deva" typeface="Mangal"/>
+        <a:font script="Telu" typeface="Gautami"/>
+        <a:font script="Taml" typeface="Latha"/>
+        <a:font script="Syrc" typeface="Estrangelo Edessa"/>
+        <a:font script="Orya" typeface="Kalinga"/>
+        <a:font script="Mlym" typeface="Kartika"/>
+        <a:font script="Laoo" typeface="DokChampa"/>
+        <a:font script="Sinh" typeface="Iskoola Pota"/>
+        <a:font script="Mong" typeface="Mongolian Baiti"/>
+        <a:font script="Viet" typeface="Times New Roman"/>
+        <a:font script="Uigh" typeface="Microsoft Uighur"/>
+        <a:font script="Geor" typeface="Sylfaen"/>
+        <a:font script="Armn" typeface="Arial"/>
+        <a:font script="Bugi" typeface="Leelawadee UI"/>
+        <a:font script="Bopo" typeface="Microsoft JhengHei"/>
+        <a:font script="Java" typeface="Javanese Text"/>
+        <a:font script="Lisu" typeface="Segoe UI"/>
+        <a:font script="Mymr" typeface="Myanmar Text"/>
+        <a:font script="Nkoo" typeface="Ebrima"/>
+        <a:font script="Olck" typeface="Nirmala UI"/>
+        <a:font script="Osma" typeface="Ebrima"/>
+        <a:font script="Phag" typeface="Phagspa"/>
+        <a:font script="Syrn" typeface="Estrangelo Edessa"/>
+        <a:font script="Syrj" typeface="Estrangelo Edessa"/>
+        <a:font script="Syre" typeface="Estrangelo Edessa"/>
+        <a:font script="Sora" typeface="Nirmala UI"/>
+        <a:font script="Tale" typeface="Microsoft Tai Le"/>
+        <a:font script="Talu" typeface="Microsoft New Tai Lue"/>
+        <a:font script="Tfng" typeface="Ebrima"/>
+      </a:majorFont>
+      <a:minorFont>
+        <a:latin typeface="Calibri" panose="020F0502020204030204"/>
+        <a:ea typeface=""/>
+        <a:cs typeface=""/>
+        <a:font script="Jpan" typeface="游ゴシック"/>
+        <a:font script="Hang" typeface="맑은 고딕"/>
+        <a:font script="Hans" typeface="等线"/>
+        <a:font script="Hant" typeface="新細明體"/>
+        <a:font script="Arab" typeface="Arial"/>
+        <a:font script="Hebr" typeface="Arial"/>
+        <a:font script="Thai" typeface="Cordia New"/>
+        <a:font script="Ethi" typeface="Nyala"/>
+        <a:font script="Beng" typeface="Vrinda"/>
+        <a:font script="Gujr" typeface="Shruti"/>
+        <a:font script="Khmr" typeface="DaunPenh"/>
+        <a:font script="Knda" typeface="Tunga"/>
+        <a:font script="Guru" typeface="Raavi"/>
+        <a:font script="Cans" typeface="Euphemia"/>
+        <a:font script="Cher" typeface="Plantagenet Cherokee"/>
+        <a:font script="Yiii" typeface="Microsoft Yi Baiti"/>
+        <a:font script="Tibt" typeface="Microsoft Himalaya"/>
+        <a:font script="Thaa" typeface="MV Boli"/>
+        <a:font script="Deva" typeface="Mangal"/>
+        <a:font script="Telu" typeface="Gautami"/>
+        <a:font script="Taml" typeface="Latha"/>
+        <a:font script="Syrc" typeface="Estrangelo Edessa"/>
+        <a:font script="Orya" typeface="Kalinga"/>
+        <a:font script="Mlym" typeface="Kartika"/>
+        <a:font script="Laoo" typeface="DokChampa"/>
+        <a:font script="Sinh" typeface="Iskoola Pota"/>
+        <a:font script="Mong" typeface="Mongolian Baiti"/>
+        <a:font script="Viet" typeface="Arial"/>
+        <a:font script="Uigh" typeface="Microsoft Uighur"/>
+        <a:font script="Geor" typeface="Sylfaen"/>
+        <a:font script="Armn" typeface="Arial"/>
+        <a:font script="Bugi" typeface="Leelawadee UI"/>
+        <a:font script="Bopo" typeface="Microsoft JhengHei"/>
+        <a:font script="Java" typeface="Javanese Text"/>
+        <a:font script="Lisu" typeface="Segoe UI"/>
+        <a:font script="Mymr" typeface="Myanmar Text"/>
+        <a:font script="Nkoo" typeface="Ebrima"/>
+        <a:font script="Olck" typeface="Nirmala UI"/>
+        <a:font script="Osma" typeface="Ebrima"/>
+        <a:font script="Phag" typeface="Phagspa"/>
+        <a:font script="Syrn" typeface="Estrangelo Edessa"/>
+        <a:font script="Syrj" typeface="Estrangelo Edessa"/>
+        <a:font script="Syre" typeface="Estrangelo Edessa"/>
+        <a:font script="Sora" typeface="Nirmala UI"/>
+        <a:font script="Tale" typeface="Microsoft Tai Le"/>
+        <a:font script="Talu" typeface="Microsoft New Tai Lue"/>
+        <a:font script="Tfng" typeface="Ebrima"/>
+      </a:minorFont>
+    </a:fontScheme>
+    <a:fmtScheme name="Office">
+      <a:fillStyleLst>
+        <a:solidFill>
+          <a:schemeClr val="phClr"/>
+        </a:solidFill>
+        <a:gradFill rotWithShape="1">
+          <a:gsLst>
+            <a:gs pos="0">
+              <a:schemeClr val="phClr">
+                <a:lumMod val="110000"/>
+                <a:satMod val="105000"/>
+                <a:tint val="67000"/>
+              </a:schemeClr>
+            </a:gs>
+            <a:gs pos="50000">
+              <a:schemeClr val="phClr">
+                <a:lumMod val="105000"/>
+                <a:satMod val="103000"/>
+                <a:tint val="73000"/>
+              </a:schemeClr>
+            </a:gs>
+            <a:gs pos="100000">
+              <a:schemeClr val="phClr">
+                <a:lumMod val="105000"/>
+                <a:satMod val="109000"/>
+                <a:tint val="81000"/>
+              </a:schemeClr>
+            </a:gs>
+          </a:gsLst>
+          <a:lin ang="5400000" scaled="0"/>
+        </a:gradFill>
+        <a:gradFill rotWithShape="1">
+          <a:gsLst>
+            <a:gs pos="0">
+              <a:schemeClr val="phClr">
+                <a:satMod val="103000"/>
+                <a:lumMod val="102000"/>
+                <a:tint val="94000"/>
+              </a:schemeClr>
+            </a:gs>
+            <a:gs pos="50000">
+              <a:schemeClr val="phClr">
+                <a:satMod val="110000"/>
+                <a:lumMod val="100000"/>
+                <a:shade val="100000"/>
+              </a:schemeClr>
+            </a:gs>
+            <a:gs pos="100000">
+              <a:schemeClr val="phClr">
+                <a:lumMod val="99000"/>
+                <a:satMod val="120000"/>
+                <a:shade val="78000"/>
+              </a:schemeClr>
+            </a:gs>
+          </a:gsLst>
+          <a:lin ang="5400000" scaled="0"/>
+        </a:gradFill>
+      </a:fillStyleLst>
+      <a:lnStyleLst>
+        <a:ln w="6350" cap="flat" cmpd="sng" algn="ctr">
+          <a:solidFill>
+            <a:schemeClr val="phClr"/>
+          </a:solidFill>
+          <a:prstDash val="solid"/>
+          <a:miter lim="800000"/>
+        </a:ln>
+        <a:ln w="12700" cap="flat" cmpd="sng" algn="ctr">
+          <a:solidFill>
+            <a:schemeClr val="phClr"/>
+          </a:solidFill>
+          <a:prstDash val="solid"/>
+          <a:miter lim="800000"/>
+        </a:ln>
+        <a:ln w="19050" cap="flat" cmpd="sng" algn="ctr">
+          <a:solidFill>
+            <a:schemeClr val="phClr"/>
+          </a:solidFill>
+          <a:prstDash val="solid"/>
+          <a:miter lim="800000"/>
+        </a:ln>
+      </a:lnStyleLst>
+      <a:effectStyleLst>
+        <a:effectStyle>
+          <a:effectLst/>
+        </a:effectStyle>
+        <a:effectStyle>
+          <a:effectLst/>
+        </a:effectStyle>
+        <a:effectStyle>
+          <a:effectLst>
+            <a:outerShdw blurRad="57150" dist="19050" dir="5400000" algn="ctr" rotWithShape="0">
+              <a:srgbClr val="000000">
+                <a:alpha val="63000"/>
+              </a:srgbClr>
+            </a:outerShdw>
+          </a:effectLst>
+        </a:effectStyle>
+      </a:effectStyleLst>
+      <a:bgFillStyleLst>
+        <a:solidFill>
+          <a:schemeClr val="phClr"/>
+        </a:solidFill>
+        <a:solidFill>
+          <a:schemeClr val="phClr">
+            <a:tint val="95000"/>
+            <a:satMod val="170000"/>
+          </a:schemeClr>
+        </a:solidFill>
+        <a:gradFill rotWithShape="1">
+          <a:gsLst>
+            <a:gs pos="0">
+              <a:schemeClr val="phClr">
+                <a:tint val="93000"/>
+                <a:satMod val="150000"/>
+                <a:shade val="98000"/>
+                <a:lumMod val="102000"/>
+              </a:schemeClr>
+            </a:gs>
+            <a:gs pos="50000">
+              <a:schemeClr val="phClr">
+                <a:tint val="98000"/>
+                <a:satMod val="130000"/>
+                <a:shade val="90000"/>
+                <a:lumMod val="103000"/>
+              </a:schemeClr>
+            </a:gs>
+            <a:gs pos="100000">
+              <a:schemeClr val="phClr">
+                <a:shade val="63000"/>
+                <a:satMod val="120000"/>
+              </a:schemeClr>
+            </a:gs>
+          </a:gsLst>
+          <a:lin ang="5400000" scaled="0"/>
+        </a:gradFill>
+      </a:bgFillStyleLst>
+    </a:fmtScheme>
+  </a:themeElements>
+  <a:objectDefaults/>
+  <a:extraClrSchemeLst/>
+  <a:extLst>
+    <a:ext uri="{05A4C25C-085E-4340-85A3-A5531E510DB2}">
+      <thm15:themeFamily xmlns:thm15="http://schemas.microsoft.com/office/thememl/2012/main" name="Office Theme" id="{62F939B6-93AF-4DB8-9C6B-D6C7DFDC589F}" vid="{4A3C46E8-61CC-4603-A589-7422A47A8E4A}"/>
+    </a:ext>
+  </a:extLst>
+</a:theme>
 </file>
</xml_diff>

<commit_message>
Adding dash in technology review
</commit_message>
<xml_diff>
--- a/doc/Technology_Review_Presentation.pptx
+++ b/doc/Technology_Review_Presentation.pptx
@@ -13,7 +13,7 @@
     <p:sldId id="257" r:id="rId4"/>
     <p:sldId id="260" r:id="rId5"/>
     <p:sldId id="261" r:id="rId6"/>
-    <p:sldId id="265" r:id="rId7"/>
+    <p:sldId id="266" r:id="rId7"/>
     <p:sldId id="263" r:id="rId8"/>
     <p:sldId id="264" r:id="rId9"/>
   </p:sldIdLst>
@@ -1044,10 +1044,9 @@
           <a:lstStyle/>
           <a:p>
             <a:r>
-              <a:rPr lang="en-US" dirty="0" err="1"/>
-              <a:t>Salik</a:t>
-            </a:r>
-            <a:endParaRPr lang="en-US" dirty="0"/>
+              <a:rPr lang="en-US" dirty="0"/>
+              <a:t>Fei</a:t>
+            </a:r>
           </a:p>
         </p:txBody>
       </p:sp>
@@ -1077,7 +1076,7 @@
     </p:spTree>
     <p:extLst>
       <p:ext uri="{BB962C8B-B14F-4D97-AF65-F5344CB8AC3E}">
-        <p14:creationId xmlns:p14="http://schemas.microsoft.com/office/powerpoint/2010/main" val="4115800761"/>
+        <p14:creationId xmlns:p14="http://schemas.microsoft.com/office/powerpoint/2010/main" val="552624859"/>
       </p:ext>
     </p:extLst>
   </p:cSld>
@@ -5244,7 +5243,7 @@
             <a:pPr lvl="1"/>
             <a:r>
               <a:rPr lang="en-US" altLang="zh-CN" dirty="0"/>
-              <a:t>Less mature but more active project maintenance recently than Dash (20 vs. 6 closed issues in the last month; 730 vs. 450 forks; 3,000 vs. 4,800 stars)</a:t>
+              <a:t>Less mature but more active project maintenance recently than Dash (20 closed issues in the last month; 730 forks; 3,000 stars)</a:t>
             </a:r>
             <a:endParaRPr lang="en-US" dirty="0"/>
           </a:p>
@@ -5371,10 +5370,10 @@
       </p:grpSpPr>
       <p:sp>
         <p:nvSpPr>
-          <p:cNvPr id="2" name="Title 1">
-            <a:extLst>
-              <a:ext uri="{FF2B5EF4-FFF2-40B4-BE49-F238E27FC236}">
-                <a16:creationId xmlns:a16="http://schemas.microsoft.com/office/drawing/2014/main" id="{415F9083-4AFA-4582-ACA1-80BBC8585D1F}"/>
+          <p:cNvPr id="4" name="Title 3">
+            <a:extLst>
+              <a:ext uri="{FF2B5EF4-FFF2-40B4-BE49-F238E27FC236}">
+                <a16:creationId xmlns:a16="http://schemas.microsoft.com/office/drawing/2014/main" id="{3C0B0A9A-2705-4AA3-9255-5BD4A8B31D95}"/>
               </a:ext>
             </a:extLst>
           </p:cNvPr>
@@ -5391,18 +5390,25 @@
           <a:lstStyle/>
           <a:p>
             <a:r>
-              <a:rPr lang="en-US" dirty="0"/>
-              <a:t>Dash Slides</a:t>
-            </a:r>
-          </a:p>
-        </p:txBody>
-      </p:sp>
-      <p:sp>
-        <p:nvSpPr>
-          <p:cNvPr id="3" name="Content Placeholder 2">
-            <a:extLst>
-              <a:ext uri="{FF2B5EF4-FFF2-40B4-BE49-F238E27FC236}">
-                <a16:creationId xmlns:a16="http://schemas.microsoft.com/office/drawing/2014/main" id="{2F62E126-287F-4D9E-AD41-8CA1D735247D}"/>
+              <a:rPr lang="en-US" sz="3600" dirty="0"/>
+              <a:t>Collisions in Washington State</a:t>
+            </a:r>
+            <a:br>
+              <a:rPr lang="en-US" dirty="0"/>
+            </a:br>
+            <a:r>
+              <a:rPr lang="en-US" dirty="0"/>
+              <a:t>Using Dash </a:t>
+            </a:r>
+          </a:p>
+        </p:txBody>
+      </p:sp>
+      <p:sp>
+        <p:nvSpPr>
+          <p:cNvPr id="8" name="Content Placeholder 4">
+            <a:extLst>
+              <a:ext uri="{FF2B5EF4-FFF2-40B4-BE49-F238E27FC236}">
+                <a16:creationId xmlns:a16="http://schemas.microsoft.com/office/drawing/2014/main" id="{A4ED4195-C0DD-4DB3-B7B1-A753E90C2BA7}"/>
               </a:ext>
             </a:extLst>
           </p:cNvPr>
@@ -5413,19 +5419,151 @@
             <p:ph idx="1"/>
           </p:nvPr>
         </p:nvSpPr>
-        <p:spPr/>
-        <p:txBody>
-          <a:bodyPr/>
-          <a:lstStyle/>
-          <a:p>
-            <a:endParaRPr lang="en-US"/>
+        <p:spPr>
+          <a:xfrm>
+            <a:off x="653561" y="1588232"/>
+            <a:ext cx="10515600" cy="4351338"/>
+          </a:xfrm>
+        </p:spPr>
+        <p:txBody>
+          <a:bodyPr>
+            <a:normAutofit/>
+          </a:bodyPr>
+          <a:lstStyle/>
+          <a:p>
+            <a:r>
+              <a:rPr lang="en-US" dirty="0"/>
+              <a:t>Appeal</a:t>
+            </a:r>
+          </a:p>
+          <a:p>
+            <a:pPr lvl="1"/>
+            <a:r>
+              <a:rPr lang="en-US" dirty="0"/>
+              <a:t>Easy to draw interactive charts using </a:t>
+            </a:r>
+            <a:r>
+              <a:rPr lang="en-US" dirty="0" err="1"/>
+              <a:t>plotly</a:t>
+            </a:r>
+            <a:endParaRPr lang="en-US" dirty="0"/>
+          </a:p>
+          <a:p>
+            <a:pPr lvl="1"/>
+            <a:r>
+              <a:rPr lang="en-US" dirty="0"/>
+              <a:t>Great documentation for supported charts</a:t>
+            </a:r>
+          </a:p>
+          <a:p>
+            <a:pPr lvl="1"/>
+            <a:r>
+              <a:rPr lang="en-US" dirty="0" err="1"/>
+              <a:t>Plotly</a:t>
+            </a:r>
+            <a:r>
+              <a:rPr lang="en-US" dirty="0"/>
+              <a:t> provides capabilities for maps using </a:t>
+            </a:r>
+            <a:r>
+              <a:rPr lang="en-US" dirty="0" err="1"/>
+              <a:t>MapBox</a:t>
+            </a:r>
+            <a:endParaRPr lang="en-US" dirty="0"/>
+          </a:p>
+          <a:p>
+            <a:pPr lvl="1"/>
+            <a:r>
+              <a:rPr lang="en-US" altLang="zh-CN" dirty="0"/>
+              <a:t>Active </a:t>
+            </a:r>
+            <a:r>
+              <a:rPr lang="en-US" altLang="zh-CN" dirty="0" err="1"/>
+              <a:t>Github</a:t>
+            </a:r>
+            <a:r>
+              <a:rPr lang="en-US" altLang="zh-CN" dirty="0"/>
+              <a:t> (6 closed issues in the last month; 450 forks; 4,800 stars)</a:t>
+            </a:r>
+            <a:endParaRPr lang="en-US" dirty="0"/>
+          </a:p>
+          <a:p>
+            <a:r>
+              <a:rPr lang="en-US" dirty="0"/>
+              <a:t>Drawbacks</a:t>
+            </a:r>
+          </a:p>
+          <a:p>
+            <a:pPr lvl="1"/>
+            <a:r>
+              <a:rPr lang="en-US" dirty="0"/>
+              <a:t>Only works with </a:t>
+            </a:r>
+            <a:r>
+              <a:rPr lang="en-US" dirty="0" err="1"/>
+              <a:t>plotly</a:t>
+            </a:r>
+            <a:r>
+              <a:rPr lang="en-US" dirty="0"/>
+              <a:t> graphs. Other libraries like matplotlib not supported. </a:t>
+            </a:r>
+          </a:p>
+          <a:p>
+            <a:pPr lvl="1"/>
+            <a:r>
+              <a:rPr lang="en-US" dirty="0"/>
+              <a:t>To use maps, a </a:t>
+            </a:r>
+            <a:r>
+              <a:rPr lang="en-US" dirty="0" err="1"/>
+              <a:t>MapBox</a:t>
+            </a:r>
+            <a:r>
+              <a:rPr lang="en-US" dirty="0"/>
+              <a:t> account is required</a:t>
+            </a:r>
+          </a:p>
+          <a:p>
+            <a:pPr lvl="1"/>
+            <a:r>
+              <a:rPr lang="en-US" dirty="0"/>
+              <a:t>Custom shape files (such as Seattle </a:t>
+            </a:r>
+            <a:r>
+              <a:rPr lang="en-US" dirty="0" err="1"/>
+              <a:t>neighbourhoods</a:t>
+            </a:r>
+            <a:r>
+              <a:rPr lang="en-US" dirty="0"/>
+              <a:t>) aren’t supported in maps</a:t>
+            </a:r>
+          </a:p>
+          <a:p>
+            <a:pPr lvl="1"/>
+            <a:endParaRPr lang="en-US" dirty="0"/>
+          </a:p>
+          <a:p>
+            <a:pPr lvl="1"/>
+            <a:endParaRPr lang="en-US" dirty="0"/>
+          </a:p>
+          <a:p>
+            <a:pPr lvl="1"/>
+            <a:endParaRPr lang="en-US" dirty="0"/>
+          </a:p>
+          <a:p>
+            <a:pPr lvl="1"/>
+            <a:endParaRPr lang="en-US" dirty="0"/>
+          </a:p>
+          <a:p>
+            <a:pPr lvl="1"/>
+            <a:endParaRPr lang="en-US" dirty="0"/>
           </a:p>
         </p:txBody>
       </p:sp>
     </p:spTree>
     <p:extLst>
       <p:ext uri="{BB962C8B-B14F-4D97-AF65-F5344CB8AC3E}">
-        <p14:creationId xmlns:p14="http://schemas.microsoft.com/office/powerpoint/2010/main" val="1026264821"/>
+        <p14:creationId xmlns:p14="http://schemas.microsoft.com/office/powerpoint/2010/main" val="445099967"/>
       </p:ext>
     </p:extLst>
   </p:cSld>

</xml_diff>

<commit_message>
modify the Tech Review slides by adding interactive ploting using Folium part
</commit_message>
<xml_diff>
--- a/doc/Technology_Review_Presentation.pptx
+++ b/doc/Technology_Review_Presentation.pptx
@@ -5,17 +5,18 @@
     <p:sldMasterId id="2147483648" r:id="rId1"/>
   </p:sldMasterIdLst>
   <p:notesMasterIdLst>
-    <p:notesMasterId r:id="rId10"/>
+    <p:notesMasterId r:id="rId11"/>
   </p:notesMasterIdLst>
   <p:sldIdLst>
     <p:sldId id="258" r:id="rId2"/>
     <p:sldId id="256" r:id="rId3"/>
     <p:sldId id="257" r:id="rId4"/>
     <p:sldId id="260" r:id="rId5"/>
-    <p:sldId id="261" r:id="rId6"/>
-    <p:sldId id="266" r:id="rId7"/>
-    <p:sldId id="263" r:id="rId8"/>
-    <p:sldId id="264" r:id="rId9"/>
+    <p:sldId id="267" r:id="rId6"/>
+    <p:sldId id="261" r:id="rId7"/>
+    <p:sldId id="266" r:id="rId8"/>
+    <p:sldId id="263" r:id="rId9"/>
+    <p:sldId id="264" r:id="rId10"/>
   </p:sldIdLst>
   <p:sldSz cx="12192000" cy="6858000"/>
   <p:notesSz cx="6858000" cy="9144000"/>
@@ -295,7 +296,7 @@
           <a:p>
             <a:fld id="{35F6A2F1-FCFD-42AB-9A88-FE39BC022128}" type="datetimeFigureOut">
               <a:rPr lang="en-US" smtClean="0"/>
-              <a:t>5/7/2018</a:t>
+              <a:t>5/8/2018</a:t>
             </a:fld>
             <a:endParaRPr lang="en-US"/>
           </a:p>
@@ -980,7 +981,7 @@
           <a:p>
             <a:fld id="{E67D8E48-E79C-46E6-AEA0-9F19B419B074}" type="slidenum">
               <a:rPr lang="en-US" smtClean="0"/>
-              <a:t>5</a:t>
+              <a:t>6</a:t>
             </a:fld>
             <a:endParaRPr lang="en-US"/>
           </a:p>
@@ -1067,7 +1068,7 @@
           <a:p>
             <a:fld id="{E67D8E48-E79C-46E6-AEA0-9F19B419B074}" type="slidenum">
               <a:rPr lang="en-US" smtClean="0"/>
-              <a:t>6</a:t>
+              <a:t>7</a:t>
             </a:fld>
             <a:endParaRPr lang="en-US"/>
           </a:p>
@@ -1155,7 +1156,7 @@
           <a:p>
             <a:fld id="{E67D8E48-E79C-46E6-AEA0-9F19B419B074}" type="slidenum">
               <a:rPr lang="en-US" smtClean="0"/>
-              <a:t>7</a:t>
+              <a:t>8</a:t>
             </a:fld>
             <a:endParaRPr lang="en-US"/>
           </a:p>
@@ -1242,7 +1243,7 @@
           <a:p>
             <a:fld id="{E67D8E48-E79C-46E6-AEA0-9F19B419B074}" type="slidenum">
               <a:rPr lang="en-US" smtClean="0"/>
-              <a:t>8</a:t>
+              <a:t>9</a:t>
             </a:fld>
             <a:endParaRPr lang="en-US"/>
           </a:p>
@@ -1408,7 +1409,7 @@
           <a:p>
             <a:fld id="{396E796B-D345-4ABC-AD98-EB7FED270790}" type="datetimeFigureOut">
               <a:rPr lang="en-US" smtClean="0"/>
-              <a:t>5/7/2018</a:t>
+              <a:t>5/8/2018</a:t>
             </a:fld>
             <a:endParaRPr lang="en-US"/>
           </a:p>
@@ -1606,7 +1607,7 @@
           <a:p>
             <a:fld id="{396E796B-D345-4ABC-AD98-EB7FED270790}" type="datetimeFigureOut">
               <a:rPr lang="en-US" smtClean="0"/>
-              <a:t>5/7/2018</a:t>
+              <a:t>5/8/2018</a:t>
             </a:fld>
             <a:endParaRPr lang="en-US"/>
           </a:p>
@@ -1814,7 +1815,7 @@
           <a:p>
             <a:fld id="{396E796B-D345-4ABC-AD98-EB7FED270790}" type="datetimeFigureOut">
               <a:rPr lang="en-US" smtClean="0"/>
-              <a:t>5/7/2018</a:t>
+              <a:t>5/8/2018</a:t>
             </a:fld>
             <a:endParaRPr lang="en-US"/>
           </a:p>
@@ -2012,7 +2013,7 @@
           <a:p>
             <a:fld id="{396E796B-D345-4ABC-AD98-EB7FED270790}" type="datetimeFigureOut">
               <a:rPr lang="en-US" smtClean="0"/>
-              <a:t>5/7/2018</a:t>
+              <a:t>5/8/2018</a:t>
             </a:fld>
             <a:endParaRPr lang="en-US"/>
           </a:p>
@@ -2287,7 +2288,7 @@
           <a:p>
             <a:fld id="{396E796B-D345-4ABC-AD98-EB7FED270790}" type="datetimeFigureOut">
               <a:rPr lang="en-US" smtClean="0"/>
-              <a:t>5/7/2018</a:t>
+              <a:t>5/8/2018</a:t>
             </a:fld>
             <a:endParaRPr lang="en-US"/>
           </a:p>
@@ -2552,7 +2553,7 @@
           <a:p>
             <a:fld id="{396E796B-D345-4ABC-AD98-EB7FED270790}" type="datetimeFigureOut">
               <a:rPr lang="en-US" smtClean="0"/>
-              <a:t>5/7/2018</a:t>
+              <a:t>5/8/2018</a:t>
             </a:fld>
             <a:endParaRPr lang="en-US"/>
           </a:p>
@@ -2964,7 +2965,7 @@
           <a:p>
             <a:fld id="{396E796B-D345-4ABC-AD98-EB7FED270790}" type="datetimeFigureOut">
               <a:rPr lang="en-US" smtClean="0"/>
-              <a:t>5/7/2018</a:t>
+              <a:t>5/8/2018</a:t>
             </a:fld>
             <a:endParaRPr lang="en-US"/>
           </a:p>
@@ -3105,7 +3106,7 @@
           <a:p>
             <a:fld id="{396E796B-D345-4ABC-AD98-EB7FED270790}" type="datetimeFigureOut">
               <a:rPr lang="en-US" smtClean="0"/>
-              <a:t>5/7/2018</a:t>
+              <a:t>5/8/2018</a:t>
             </a:fld>
             <a:endParaRPr lang="en-US"/>
           </a:p>
@@ -3218,7 +3219,7 @@
           <a:p>
             <a:fld id="{396E796B-D345-4ABC-AD98-EB7FED270790}" type="datetimeFigureOut">
               <a:rPr lang="en-US" smtClean="0"/>
-              <a:t>5/7/2018</a:t>
+              <a:t>5/8/2018</a:t>
             </a:fld>
             <a:endParaRPr lang="en-US"/>
           </a:p>
@@ -3529,7 +3530,7 @@
           <a:p>
             <a:fld id="{396E796B-D345-4ABC-AD98-EB7FED270790}" type="datetimeFigureOut">
               <a:rPr lang="en-US" smtClean="0"/>
-              <a:t>5/7/2018</a:t>
+              <a:t>5/8/2018</a:t>
             </a:fld>
             <a:endParaRPr lang="en-US"/>
           </a:p>
@@ -3817,7 +3818,7 @@
           <a:p>
             <a:fld id="{396E796B-D345-4ABC-AD98-EB7FED270790}" type="datetimeFigureOut">
               <a:rPr lang="en-US" smtClean="0"/>
-              <a:t>5/7/2018</a:t>
+              <a:t>5/8/2018</a:t>
             </a:fld>
             <a:endParaRPr lang="en-US"/>
           </a:p>
@@ -4058,7 +4059,7 @@
           <a:p>
             <a:fld id="{396E796B-D345-4ABC-AD98-EB7FED270790}" type="datetimeFigureOut">
               <a:rPr lang="en-US" smtClean="0"/>
-              <a:t>5/7/2018</a:t>
+              <a:t>5/8/2018</a:t>
             </a:fld>
             <a:endParaRPr lang="en-US"/>
           </a:p>
@@ -5111,243 +5112,501 @@
           <a:chExt cx="0" cy="0"/>
         </a:xfrm>
       </p:grpSpPr>
-      <p:sp>
-        <p:nvSpPr>
-          <p:cNvPr id="4" name="Title 3">
-            <a:extLst>
-              <a:ext uri="{FF2B5EF4-FFF2-40B4-BE49-F238E27FC236}">
-                <a16:creationId xmlns:a16="http://schemas.microsoft.com/office/drawing/2014/main" id="{3C0B0A9A-2705-4AA3-9255-5BD4A8B31D95}"/>
-              </a:ext>
-            </a:extLst>
-          </p:cNvPr>
-          <p:cNvSpPr>
-            <a:spLocks noGrp="1"/>
-          </p:cNvSpPr>
-          <p:nvPr>
-            <p:ph type="title"/>
-          </p:nvPr>
-        </p:nvSpPr>
-        <p:spPr/>
-        <p:txBody>
-          <a:bodyPr/>
-          <a:lstStyle/>
-          <a:p>
-            <a:r>
-              <a:rPr lang="en-US" sz="3600" dirty="0"/>
-              <a:t>Collisions in Washington State</a:t>
-            </a:r>
-            <a:br>
-              <a:rPr lang="en-US" dirty="0"/>
-            </a:br>
-            <a:r>
-              <a:rPr lang="en-US" dirty="0"/>
-              <a:t>Using Folium </a:t>
-            </a:r>
-          </a:p>
-        </p:txBody>
-      </p:sp>
-      <p:sp>
-        <p:nvSpPr>
-          <p:cNvPr id="8" name="Content Placeholder 4">
-            <a:extLst>
-              <a:ext uri="{FF2B5EF4-FFF2-40B4-BE49-F238E27FC236}">
-                <a16:creationId xmlns:a16="http://schemas.microsoft.com/office/drawing/2014/main" id="{A4ED4195-C0DD-4DB3-B7B1-A753E90C2BA7}"/>
-              </a:ext>
-            </a:extLst>
-          </p:cNvPr>
-          <p:cNvSpPr>
-            <a:spLocks noGrp="1"/>
-          </p:cNvSpPr>
+      <p:pic>
+        <p:nvPicPr>
+          <p:cNvPr id="5" name="foliumVisReviewFei - Google Chrome 5_8_2018 1_29_57 PMTrim">
+            <a:hlinkClick r:id="" action="ppaction://media"/>
+            <a:extLst>
+              <a:ext uri="{FF2B5EF4-FFF2-40B4-BE49-F238E27FC236}">
+                <a16:creationId xmlns:a16="http://schemas.microsoft.com/office/drawing/2014/main" id="{CE33FAEC-3DCC-4130-B682-50C0A48047EC}"/>
+              </a:ext>
+            </a:extLst>
+          </p:cNvPr>
+          <p:cNvPicPr>
+            <a:picLocks noGrp="1" noChangeAspect="1"/>
+          </p:cNvPicPr>
           <p:nvPr>
             <p:ph idx="1"/>
-          </p:nvPr>
-        </p:nvSpPr>
+            <a:videoFile r:link="rId2"/>
+            <p:extLst>
+              <p:ext uri="{DAA4B4D4-6D71-4841-9C94-3DE7FCFB9230}">
+                <p14:media xmlns:p14="http://schemas.microsoft.com/office/powerpoint/2010/main" r:embed="rId1"/>
+              </p:ext>
+            </p:extLst>
+          </p:nvPr>
+        </p:nvPicPr>
+        <p:blipFill rotWithShape="1">
+          <a:blip r:embed="rId4"/>
+          <a:srcRect l="10052" t="16810" r="10876" b="11802"/>
+          <a:stretch/>
+        </p:blipFill>
         <p:spPr>
           <a:xfrm>
-            <a:off x="653561" y="1588232"/>
-            <a:ext cx="10515600" cy="4351338"/>
+            <a:off x="568569" y="3504472"/>
+            <a:ext cx="5852160" cy="3291840"/>
           </a:xfrm>
         </p:spPr>
-        <p:txBody>
-          <a:bodyPr>
-            <a:normAutofit fontScale="85000" lnSpcReduction="20000"/>
+      </p:pic>
+      <p:sp>
+        <p:nvSpPr>
+          <p:cNvPr id="4" name="Title 3">
+            <a:extLst>
+              <a:ext uri="{FF2B5EF4-FFF2-40B4-BE49-F238E27FC236}">
+                <a16:creationId xmlns:a16="http://schemas.microsoft.com/office/drawing/2014/main" id="{7EDBD886-C874-4130-B087-6203AA9A5B25}"/>
+              </a:ext>
+            </a:extLst>
+          </p:cNvPr>
+          <p:cNvSpPr txBox="1">
+            <a:spLocks/>
+          </p:cNvSpPr>
+          <p:nvPr/>
+        </p:nvSpPr>
+        <p:spPr>
+          <a:xfrm>
+            <a:off x="990600" y="517525"/>
+            <a:ext cx="10515600" cy="1325563"/>
+          </a:xfrm>
+          <a:prstGeom prst="rect">
+            <a:avLst/>
+          </a:prstGeom>
+        </p:spPr>
+        <p:txBody>
+          <a:bodyPr vert="horz" lIns="91440" tIns="45720" rIns="91440" bIns="45720" rtlCol="0" anchor="ctr">
+            <a:normAutofit/>
           </a:bodyPr>
-          <a:lstStyle/>
-          <a:p>
-            <a:r>
-              <a:rPr lang="en-US" dirty="0"/>
-              <a:t>Appeal</a:t>
-            </a:r>
-          </a:p>
-          <a:p>
-            <a:pPr lvl="1"/>
-            <a:r>
-              <a:rPr lang="en-US" dirty="0"/>
-              <a:t>Easy to quickly plot &amp; cluster any </a:t>
-            </a:r>
-            <a:r>
-              <a:rPr lang="en-US" dirty="0" err="1"/>
-              <a:t>lat</a:t>
-            </a:r>
-            <a:r>
-              <a:rPr lang="en-US" dirty="0"/>
-              <a:t>/</a:t>
-            </a:r>
-            <a:r>
-              <a:rPr lang="en-US" dirty="0" err="1"/>
-              <a:t>lon</a:t>
-            </a:r>
-            <a:r>
-              <a:rPr lang="en-US" dirty="0"/>
-              <a:t> data</a:t>
-            </a:r>
-          </a:p>
-          <a:p>
-            <a:pPr lvl="1"/>
-            <a:r>
-              <a:rPr lang="en-US" dirty="0"/>
-              <a:t>Seems to work with shape files or </a:t>
-            </a:r>
-            <a:r>
-              <a:rPr lang="en-US" dirty="0" err="1"/>
-              <a:t>choropeth</a:t>
-            </a:r>
-            <a:r>
-              <a:rPr lang="en-US" dirty="0"/>
-              <a:t> mapping </a:t>
-            </a:r>
-          </a:p>
-          <a:p>
-            <a:pPr lvl="1"/>
-            <a:r>
-              <a:rPr lang="en-US" dirty="0"/>
-              <a:t>Lots of flexibility on map appearance and 3</a:t>
-            </a:r>
-            <a:r>
-              <a:rPr lang="en-US" baseline="30000" dirty="0"/>
-              <a:t>rd</a:t>
-            </a:r>
-            <a:r>
-              <a:rPr lang="en-US" dirty="0"/>
-              <a:t> party plug-ins</a:t>
-            </a:r>
-          </a:p>
-          <a:p>
-            <a:pPr lvl="1"/>
-            <a:r>
-              <a:rPr lang="en-US" dirty="0"/>
-              <a:t>Builds on top of Leaflet, so includes many of it’s capabilities?</a:t>
-            </a:r>
-          </a:p>
-          <a:p>
-            <a:pPr lvl="1"/>
-            <a:r>
-              <a:rPr lang="en-US" altLang="zh-CN" dirty="0"/>
-              <a:t>Less mature but more active project maintenance recently than Dash (20 closed issues in the last month; 730 forks; 3,000 stars)</a:t>
+          <a:lstStyle>
+            <a:lvl1pPr algn="l" defTabSz="914400" rtl="0" eaLnBrk="1" latinLnBrk="0" hangingPunct="1">
+              <a:lnSpc>
+                <a:spcPct val="90000"/>
+              </a:lnSpc>
+              <a:spcBef>
+                <a:spcPct val="0"/>
+              </a:spcBef>
+              <a:buNone/>
+              <a:defRPr sz="4400" kern="1200">
+                <a:solidFill>
+                  <a:schemeClr val="tx1"/>
+                </a:solidFill>
+                <a:latin typeface="+mj-lt"/>
+                <a:ea typeface="+mj-ea"/>
+                <a:cs typeface="+mj-cs"/>
+              </a:defRPr>
+            </a:lvl1pPr>
+          </a:lstStyle>
+          <a:p>
+            <a:r>
+              <a:rPr lang="en-US" sz="3600"/>
+              <a:t>Collisions in Washington State</a:t>
+            </a:r>
+            <a:br>
+              <a:rPr lang="en-US"/>
+            </a:br>
+            <a:r>
+              <a:rPr lang="en-US"/>
+              <a:t>Using Folium </a:t>
             </a:r>
             <a:endParaRPr lang="en-US" dirty="0"/>
           </a:p>
-          <a:p>
-            <a:r>
-              <a:rPr lang="en-US" dirty="0"/>
-              <a:t>Drawbacks</a:t>
-            </a:r>
-          </a:p>
-          <a:p>
-            <a:pPr lvl="1"/>
-            <a:r>
-              <a:rPr lang="en-US" dirty="0"/>
-              <a:t>Not as easy to make interactive dashboards as </a:t>
-            </a:r>
-            <a:r>
-              <a:rPr lang="en-US" dirty="0" err="1"/>
-              <a:t>plotly</a:t>
-            </a:r>
-            <a:r>
-              <a:rPr lang="en-US" dirty="0"/>
-              <a:t>? (investigating the </a:t>
-            </a:r>
-            <a:r>
-              <a:rPr lang="en-US" dirty="0" err="1"/>
+        </p:txBody>
+      </p:sp>
+      <p:pic>
+        <p:nvPicPr>
+          <p:cNvPr id="6" name="Picture 5">
+            <a:extLst>
+              <a:ext uri="{FF2B5EF4-FFF2-40B4-BE49-F238E27FC236}">
+                <a16:creationId xmlns:a16="http://schemas.microsoft.com/office/drawing/2014/main" id="{A7786BFD-45AC-4D76-BC81-63D432233ABE}"/>
+              </a:ext>
+            </a:extLst>
+          </p:cNvPr>
+          <p:cNvPicPr>
+            <a:picLocks noChangeAspect="1"/>
+          </p:cNvPicPr>
+          <p:nvPr/>
+        </p:nvPicPr>
+        <p:blipFill>
+          <a:blip r:embed="rId5"/>
+          <a:stretch>
+            <a:fillRect/>
+          </a:stretch>
+        </p:blipFill>
+        <p:spPr>
+          <a:xfrm>
+            <a:off x="1063503" y="1786313"/>
+            <a:ext cx="5357226" cy="1718159"/>
+          </a:xfrm>
+          <a:prstGeom prst="rect">
+            <a:avLst/>
+          </a:prstGeom>
+        </p:spPr>
+      </p:pic>
+      <p:sp>
+        <p:nvSpPr>
+          <p:cNvPr id="7" name="Content Placeholder 4">
+            <a:extLst>
+              <a:ext uri="{FF2B5EF4-FFF2-40B4-BE49-F238E27FC236}">
+                <a16:creationId xmlns:a16="http://schemas.microsoft.com/office/drawing/2014/main" id="{035D262E-38E3-4898-98B4-910393CC513C}"/>
+              </a:ext>
+            </a:extLst>
+          </p:cNvPr>
+          <p:cNvSpPr txBox="1">
+            <a:spLocks/>
+          </p:cNvSpPr>
+          <p:nvPr/>
+        </p:nvSpPr>
+        <p:spPr>
+          <a:xfrm>
+            <a:off x="6796452" y="1786313"/>
+            <a:ext cx="4826979" cy="3228600"/>
+          </a:xfrm>
+          <a:prstGeom prst="rect">
+            <a:avLst/>
+          </a:prstGeom>
+        </p:spPr>
+        <p:txBody>
+          <a:bodyPr vert="horz" lIns="91440" tIns="45720" rIns="91440" bIns="45720" rtlCol="0">
+            <a:normAutofit fontScale="92500" lnSpcReduction="10000"/>
+          </a:bodyPr>
+          <a:lstStyle>
+            <a:lvl1pPr marL="228600" indent="-228600" algn="l" defTabSz="914400" rtl="0" eaLnBrk="1" latinLnBrk="0" hangingPunct="1">
+              <a:lnSpc>
+                <a:spcPct val="90000"/>
+              </a:lnSpc>
+              <a:spcBef>
+                <a:spcPts val="1000"/>
+              </a:spcBef>
+              <a:buFont typeface="Arial" panose="020B0604020202020204" pitchFamily="34" charset="0"/>
+              <a:buChar char="•"/>
+              <a:defRPr sz="2800" kern="1200">
+                <a:solidFill>
+                  <a:schemeClr val="tx1"/>
+                </a:solidFill>
+                <a:latin typeface="+mn-lt"/>
+                <a:ea typeface="+mn-ea"/>
+                <a:cs typeface="+mn-cs"/>
+              </a:defRPr>
+            </a:lvl1pPr>
+            <a:lvl2pPr marL="685800" indent="-228600" algn="l" defTabSz="914400" rtl="0" eaLnBrk="1" latinLnBrk="0" hangingPunct="1">
+              <a:lnSpc>
+                <a:spcPct val="90000"/>
+              </a:lnSpc>
+              <a:spcBef>
+                <a:spcPts val="500"/>
+              </a:spcBef>
+              <a:buFont typeface="Arial" panose="020B0604020202020204" pitchFamily="34" charset="0"/>
+              <a:buChar char="•"/>
+              <a:defRPr sz="2400" kern="1200">
+                <a:solidFill>
+                  <a:schemeClr val="tx1"/>
+                </a:solidFill>
+                <a:latin typeface="+mn-lt"/>
+                <a:ea typeface="+mn-ea"/>
+                <a:cs typeface="+mn-cs"/>
+              </a:defRPr>
+            </a:lvl2pPr>
+            <a:lvl3pPr marL="1143000" indent="-228600" algn="l" defTabSz="914400" rtl="0" eaLnBrk="1" latinLnBrk="0" hangingPunct="1">
+              <a:lnSpc>
+                <a:spcPct val="90000"/>
+              </a:lnSpc>
+              <a:spcBef>
+                <a:spcPts val="500"/>
+              </a:spcBef>
+              <a:buFont typeface="Arial" panose="020B0604020202020204" pitchFamily="34" charset="0"/>
+              <a:buChar char="•"/>
+              <a:defRPr sz="2000" kern="1200">
+                <a:solidFill>
+                  <a:schemeClr val="tx1"/>
+                </a:solidFill>
+                <a:latin typeface="+mn-lt"/>
+                <a:ea typeface="+mn-ea"/>
+                <a:cs typeface="+mn-cs"/>
+              </a:defRPr>
+            </a:lvl3pPr>
+            <a:lvl4pPr marL="1600200" indent="-228600" algn="l" defTabSz="914400" rtl="0" eaLnBrk="1" latinLnBrk="0" hangingPunct="1">
+              <a:lnSpc>
+                <a:spcPct val="90000"/>
+              </a:lnSpc>
+              <a:spcBef>
+                <a:spcPts val="500"/>
+              </a:spcBef>
+              <a:buFont typeface="Arial" panose="020B0604020202020204" pitchFamily="34" charset="0"/>
+              <a:buChar char="•"/>
+              <a:defRPr sz="1800" kern="1200">
+                <a:solidFill>
+                  <a:schemeClr val="tx1"/>
+                </a:solidFill>
+                <a:latin typeface="+mn-lt"/>
+                <a:ea typeface="+mn-ea"/>
+                <a:cs typeface="+mn-cs"/>
+              </a:defRPr>
+            </a:lvl4pPr>
+            <a:lvl5pPr marL="2057400" indent="-228600" algn="l" defTabSz="914400" rtl="0" eaLnBrk="1" latinLnBrk="0" hangingPunct="1">
+              <a:lnSpc>
+                <a:spcPct val="90000"/>
+              </a:lnSpc>
+              <a:spcBef>
+                <a:spcPts val="500"/>
+              </a:spcBef>
+              <a:buFont typeface="Arial" panose="020B0604020202020204" pitchFamily="34" charset="0"/>
+              <a:buChar char="•"/>
+              <a:defRPr sz="1800" kern="1200">
+                <a:solidFill>
+                  <a:schemeClr val="tx1"/>
+                </a:solidFill>
+                <a:latin typeface="+mn-lt"/>
+                <a:ea typeface="+mn-ea"/>
+                <a:cs typeface="+mn-cs"/>
+              </a:defRPr>
+            </a:lvl5pPr>
+            <a:lvl6pPr marL="2514600" indent="-228600" algn="l" defTabSz="914400" rtl="0" eaLnBrk="1" latinLnBrk="0" hangingPunct="1">
+              <a:lnSpc>
+                <a:spcPct val="90000"/>
+              </a:lnSpc>
+              <a:spcBef>
+                <a:spcPts val="500"/>
+              </a:spcBef>
+              <a:buFont typeface="Arial" panose="020B0604020202020204" pitchFamily="34" charset="0"/>
+              <a:buChar char="•"/>
+              <a:defRPr sz="1800" kern="1200">
+                <a:solidFill>
+                  <a:schemeClr val="tx1"/>
+                </a:solidFill>
+                <a:latin typeface="+mn-lt"/>
+                <a:ea typeface="+mn-ea"/>
+                <a:cs typeface="+mn-cs"/>
+              </a:defRPr>
+            </a:lvl6pPr>
+            <a:lvl7pPr marL="2971800" indent="-228600" algn="l" defTabSz="914400" rtl="0" eaLnBrk="1" latinLnBrk="0" hangingPunct="1">
+              <a:lnSpc>
+                <a:spcPct val="90000"/>
+              </a:lnSpc>
+              <a:spcBef>
+                <a:spcPts val="500"/>
+              </a:spcBef>
+              <a:buFont typeface="Arial" panose="020B0604020202020204" pitchFamily="34" charset="0"/>
+              <a:buChar char="•"/>
+              <a:defRPr sz="1800" kern="1200">
+                <a:solidFill>
+                  <a:schemeClr val="tx1"/>
+                </a:solidFill>
+                <a:latin typeface="+mn-lt"/>
+                <a:ea typeface="+mn-ea"/>
+                <a:cs typeface="+mn-cs"/>
+              </a:defRPr>
+            </a:lvl7pPr>
+            <a:lvl8pPr marL="3429000" indent="-228600" algn="l" defTabSz="914400" rtl="0" eaLnBrk="1" latinLnBrk="0" hangingPunct="1">
+              <a:lnSpc>
+                <a:spcPct val="90000"/>
+              </a:lnSpc>
+              <a:spcBef>
+                <a:spcPts val="500"/>
+              </a:spcBef>
+              <a:buFont typeface="Arial" panose="020B0604020202020204" pitchFamily="34" charset="0"/>
+              <a:buChar char="•"/>
+              <a:defRPr sz="1800" kern="1200">
+                <a:solidFill>
+                  <a:schemeClr val="tx1"/>
+                </a:solidFill>
+                <a:latin typeface="+mn-lt"/>
+                <a:ea typeface="+mn-ea"/>
+                <a:cs typeface="+mn-cs"/>
+              </a:defRPr>
+            </a:lvl8pPr>
+            <a:lvl9pPr marL="3886200" indent="-228600" algn="l" defTabSz="914400" rtl="0" eaLnBrk="1" latinLnBrk="0" hangingPunct="1">
+              <a:lnSpc>
+                <a:spcPct val="90000"/>
+              </a:lnSpc>
+              <a:spcBef>
+                <a:spcPts val="500"/>
+              </a:spcBef>
+              <a:buFont typeface="Arial" panose="020B0604020202020204" pitchFamily="34" charset="0"/>
+              <a:buChar char="•"/>
+              <a:defRPr sz="1800" kern="1200">
+                <a:solidFill>
+                  <a:schemeClr val="tx1"/>
+                </a:solidFill>
+                <a:latin typeface="+mn-lt"/>
+                <a:ea typeface="+mn-ea"/>
+                <a:cs typeface="+mn-cs"/>
+              </a:defRPr>
+            </a:lvl9pPr>
+          </a:lstStyle>
+          <a:p>
+            <a:r>
+              <a:rPr lang="en-US" dirty="0"/>
+              <a:t>Interactive Plotting</a:t>
+            </a:r>
+          </a:p>
+          <a:p>
+            <a:r>
+              <a:rPr lang="en-US" dirty="0"/>
+              <a:t>Many of our use cases requires the ability to create visualizations with temporal data</a:t>
+            </a:r>
+          </a:p>
+          <a:p>
+            <a:r>
+              <a:rPr lang="en-US" dirty="0"/>
+              <a:t>Folium’s </a:t>
+            </a:r>
+            <a:r>
+              <a:rPr lang="en-US" i="1" dirty="0" err="1"/>
               <a:t>HeatMapWithTime</a:t>
             </a:r>
             <a:r>
-              <a:rPr lang="en-US" dirty="0"/>
-              <a:t> plugin)</a:t>
-            </a:r>
-          </a:p>
-          <a:p>
-            <a:pPr lvl="1"/>
-            <a:r>
-              <a:rPr lang="en-US" dirty="0"/>
-              <a:t>Adding &gt;1000 markers seems slow (there may be a plugin to fix this?)</a:t>
-            </a:r>
-          </a:p>
-          <a:p>
-            <a:pPr lvl="1"/>
-            <a:r>
-              <a:rPr lang="en-US" dirty="0"/>
-              <a:t>Some example codes from the documentation site is outdated, maybe due to rapid updates recently?</a:t>
-            </a:r>
-          </a:p>
-          <a:p>
-            <a:pPr lvl="2"/>
-            <a:r>
-              <a:rPr lang="en-US" dirty="0"/>
-              <a:t>module 'folium' has no attribute '</a:t>
-            </a:r>
-            <a:r>
-              <a:rPr lang="en-US" dirty="0" err="1"/>
-              <a:t>raster_layers</a:t>
-            </a:r>
-            <a:r>
-              <a:rPr lang="en-US" dirty="0"/>
-              <a:t>’ </a:t>
-            </a:r>
-          </a:p>
-          <a:p>
-            <a:pPr lvl="2"/>
-            <a:r>
-              <a:rPr lang="en-US" dirty="0"/>
-              <a:t>Seems some functions of </a:t>
-            </a:r>
-            <a:r>
-              <a:rPr lang="en-US" dirty="0" err="1"/>
-              <a:t>branca</a:t>
-            </a:r>
-            <a:r>
-              <a:rPr lang="en-US" dirty="0"/>
-              <a:t> are degenerated (and there is no doc for </a:t>
-            </a:r>
-            <a:r>
-              <a:rPr lang="en-US" dirty="0" err="1"/>
-              <a:t>branca</a:t>
-            </a:r>
-            <a:r>
-              <a:rPr lang="en-US" dirty="0"/>
-              <a:t>)</a:t>
-            </a:r>
-          </a:p>
-          <a:p>
-            <a:pPr lvl="1"/>
-            <a:endParaRPr lang="en-US" dirty="0"/>
-          </a:p>
-          <a:p>
-            <a:pPr lvl="1"/>
-            <a:endParaRPr lang="en-US" dirty="0"/>
+              <a:rPr lang="en-US" i="1" dirty="0"/>
+              <a:t> </a:t>
+            </a:r>
+            <a:r>
+              <a:rPr lang="en-US" dirty="0"/>
+              <a:t>Plug-in makes it very easy to visualize the cluster of collisions over time</a:t>
+            </a:r>
           </a:p>
         </p:txBody>
       </p:sp>
     </p:spTree>
     <p:extLst>
       <p:ext uri="{BB962C8B-B14F-4D97-AF65-F5344CB8AC3E}">
-        <p14:creationId xmlns:p14="http://schemas.microsoft.com/office/powerpoint/2010/main" val="3915264646"/>
+        <p14:creationId xmlns:p14="http://schemas.microsoft.com/office/powerpoint/2010/main" val="3442499781"/>
       </p:ext>
     </p:extLst>
   </p:cSld>
   <p:clrMapOvr>
     <a:masterClrMapping/>
   </p:clrMapOvr>
+  <p:timing>
+    <p:tnLst>
+      <p:par>
+        <p:cTn id="1" dur="indefinite" restart="never" nodeType="tmRoot">
+          <p:childTnLst>
+            <p:seq concurrent="1" nextAc="seek">
+              <p:cTn id="2" dur="indefinite" nodeType="mainSeq">
+                <p:childTnLst>
+                  <p:par>
+                    <p:cTn id="3" fill="hold">
+                      <p:stCondLst>
+                        <p:cond delay="indefinite"/>
+                      </p:stCondLst>
+                      <p:childTnLst>
+                        <p:par>
+                          <p:cTn id="4" fill="hold">
+                            <p:stCondLst>
+                              <p:cond delay="0"/>
+                            </p:stCondLst>
+                            <p:childTnLst>
+                              <p:par>
+                                <p:cTn id="5" presetID="1" presetClass="mediacall" presetSubtype="0" fill="hold" nodeType="clickEffect">
+                                  <p:stCondLst>
+                                    <p:cond delay="0"/>
+                                  </p:stCondLst>
+                                  <p:childTnLst>
+                                    <p:cmd type="call" cmd="playFrom(0.0)">
+                                      <p:cBhvr>
+                                        <p:cTn id="6" dur="10250" fill="hold"/>
+                                        <p:tgtEl>
+                                          <p:spTgt spid="5"/>
+                                        </p:tgtEl>
+                                      </p:cBhvr>
+                                    </p:cmd>
+                                  </p:childTnLst>
+                                </p:cTn>
+                              </p:par>
+                            </p:childTnLst>
+                          </p:cTn>
+                        </p:par>
+                      </p:childTnLst>
+                    </p:cTn>
+                  </p:par>
+                </p:childTnLst>
+              </p:cTn>
+              <p:prevCondLst>
+                <p:cond evt="onPrev" delay="0">
+                  <p:tgtEl>
+                    <p:sldTgt/>
+                  </p:tgtEl>
+                </p:cond>
+              </p:prevCondLst>
+              <p:nextCondLst>
+                <p:cond evt="onNext" delay="0">
+                  <p:tgtEl>
+                    <p:sldTgt/>
+                  </p:tgtEl>
+                </p:cond>
+              </p:nextCondLst>
+            </p:seq>
+            <p:video>
+              <p:cMediaNode vol="80000">
+                <p:cTn id="7" fill="hold" display="0">
+                  <p:stCondLst>
+                    <p:cond delay="indefinite"/>
+                  </p:stCondLst>
+                </p:cTn>
+                <p:tgtEl>
+                  <p:spTgt spid="5"/>
+                </p:tgtEl>
+              </p:cMediaNode>
+            </p:video>
+            <p:seq concurrent="1" nextAc="seek">
+              <p:cTn id="8" restart="whenNotActive" fill="hold" evtFilter="cancelBubble" nodeType="interactiveSeq">
+                <p:stCondLst>
+                  <p:cond evt="onClick" delay="0">
+                    <p:tgtEl>
+                      <p:spTgt spid="5"/>
+                    </p:tgtEl>
+                  </p:cond>
+                </p:stCondLst>
+                <p:endSync evt="end" delay="0">
+                  <p:rtn val="all"/>
+                </p:endSync>
+                <p:childTnLst>
+                  <p:par>
+                    <p:cTn id="9" fill="hold">
+                      <p:stCondLst>
+                        <p:cond delay="0"/>
+                      </p:stCondLst>
+                      <p:childTnLst>
+                        <p:par>
+                          <p:cTn id="10" fill="hold">
+                            <p:stCondLst>
+                              <p:cond delay="0"/>
+                            </p:stCondLst>
+                            <p:childTnLst>
+                              <p:par>
+                                <p:cTn id="11" presetID="2" presetClass="mediacall" presetSubtype="0" fill="hold" nodeType="clickEffect">
+                                  <p:stCondLst>
+                                    <p:cond delay="0"/>
+                                  </p:stCondLst>
+                                  <p:childTnLst>
+                                    <p:cmd type="call" cmd="togglePause">
+                                      <p:cBhvr>
+                                        <p:cTn id="12" dur="1" fill="hold"/>
+                                        <p:tgtEl>
+                                          <p:spTgt spid="5"/>
+                                        </p:tgtEl>
+                                      </p:cBhvr>
+                                    </p:cmd>
+                                  </p:childTnLst>
+                                </p:cTn>
+                              </p:par>
+                            </p:childTnLst>
+                          </p:cTn>
+                        </p:par>
+                      </p:childTnLst>
+                    </p:cTn>
+                  </p:par>
+                </p:childTnLst>
+              </p:cTn>
+              <p:nextCondLst>
+                <p:cond evt="onClick" delay="0">
+                  <p:tgtEl>
+                    <p:spTgt spid="5"/>
+                  </p:tgtEl>
+                </p:cond>
+              </p:nextCondLst>
+            </p:seq>
+          </p:childTnLst>
+        </p:cTn>
+      </p:par>
+    </p:tnLst>
+  </p:timing>
 </p:sld>
 </file>
 
@@ -5398,7 +5657,7 @@
             </a:br>
             <a:r>
               <a:rPr lang="en-US" dirty="0"/>
-              <a:t>Using Dash </a:t>
+              <a:t>Using Folium </a:t>
             </a:r>
           </a:p>
         </p:txBody>
@@ -5427,7 +5686,7 @@
         </p:spPr>
         <p:txBody>
           <a:bodyPr>
-            <a:normAutofit/>
+            <a:normAutofit fontScale="85000" lnSpcReduction="20000"/>
           </a:bodyPr>
           <a:lstStyle/>
           <a:p>
@@ -5440,115 +5699,142 @@
             <a:pPr lvl="1"/>
             <a:r>
               <a:rPr lang="en-US" dirty="0"/>
-              <a:t>Easy to draw interactive charts using </a:t>
+              <a:t>Easy to quickly plot &amp; cluster any </a:t>
+            </a:r>
+            <a:r>
+              <a:rPr lang="en-US" dirty="0" err="1"/>
+              <a:t>lat</a:t>
+            </a:r>
+            <a:r>
+              <a:rPr lang="en-US" dirty="0"/>
+              <a:t>/</a:t>
+            </a:r>
+            <a:r>
+              <a:rPr lang="en-US" dirty="0" err="1"/>
+              <a:t>lon</a:t>
+            </a:r>
+            <a:r>
+              <a:rPr lang="en-US" dirty="0"/>
+              <a:t> data</a:t>
+            </a:r>
+          </a:p>
+          <a:p>
+            <a:pPr lvl="1"/>
+            <a:r>
+              <a:rPr lang="en-US" dirty="0"/>
+              <a:t>Seems to work with shape files or </a:t>
+            </a:r>
+            <a:r>
+              <a:rPr lang="en-US" dirty="0" err="1"/>
+              <a:t>choropeth</a:t>
+            </a:r>
+            <a:r>
+              <a:rPr lang="en-US" dirty="0"/>
+              <a:t> mapping </a:t>
+            </a:r>
+          </a:p>
+          <a:p>
+            <a:pPr lvl="1"/>
+            <a:r>
+              <a:rPr lang="en-US" dirty="0"/>
+              <a:t>Lots of flexibility on map appearance and 3</a:t>
+            </a:r>
+            <a:r>
+              <a:rPr lang="en-US" baseline="30000" dirty="0"/>
+              <a:t>rd</a:t>
+            </a:r>
+            <a:r>
+              <a:rPr lang="en-US" dirty="0"/>
+              <a:t> party plug-ins</a:t>
+            </a:r>
+          </a:p>
+          <a:p>
+            <a:pPr lvl="1"/>
+            <a:r>
+              <a:rPr lang="en-US" dirty="0"/>
+              <a:t>Builds on top of Leaflet, so includes many of it’s capabilities</a:t>
+            </a:r>
+          </a:p>
+          <a:p>
+            <a:pPr lvl="1"/>
+            <a:r>
+              <a:rPr lang="en-US" altLang="zh-CN" dirty="0"/>
+              <a:t>Less mature but more active project maintenance recently than Dash (20 closed issues in the last month; 730 forks; 3,000 stars)</a:t>
+            </a:r>
+            <a:endParaRPr lang="en-US" dirty="0"/>
+          </a:p>
+          <a:p>
+            <a:r>
+              <a:rPr lang="en-US" dirty="0"/>
+              <a:t>Drawbacks</a:t>
+            </a:r>
+          </a:p>
+          <a:p>
+            <a:pPr lvl="1"/>
+            <a:r>
+              <a:rPr lang="en-US" dirty="0"/>
+              <a:t>Not as easy to make interactive dashboards as </a:t>
             </a:r>
             <a:r>
               <a:rPr lang="en-US" dirty="0" err="1"/>
               <a:t>plotly</a:t>
             </a:r>
-            <a:endParaRPr lang="en-US" dirty="0"/>
+            <a:r>
+              <a:rPr lang="en-US" dirty="0"/>
+              <a:t>? (But seems good enough for our use cases)</a:t>
+            </a:r>
           </a:p>
           <a:p>
             <a:pPr lvl="1"/>
             <a:r>
               <a:rPr lang="en-US" dirty="0"/>
-              <a:t>Great documentation for supported charts</a:t>
+              <a:t>Adding &gt;1000 markers seems slow (there may be a plugin to fix this?)</a:t>
             </a:r>
           </a:p>
           <a:p>
             <a:pPr lvl="1"/>
             <a:r>
+              <a:rPr lang="en-US" dirty="0"/>
+              <a:t>Some example codes from the documentation site is outdated, maybe due to rapid updates recently?</a:t>
+            </a:r>
+          </a:p>
+          <a:p>
+            <a:pPr lvl="2"/>
+            <a:r>
+              <a:rPr lang="en-US" dirty="0"/>
+              <a:t>module 'folium' has no attribute '</a:t>
+            </a:r>
+            <a:r>
               <a:rPr lang="en-US" dirty="0" err="1"/>
-              <a:t>Plotly</a:t>
-            </a:r>
-            <a:r>
-              <a:rPr lang="en-US" dirty="0"/>
-              <a:t> provides capabilities for maps using </a:t>
+              <a:t>raster_layers</a:t>
+            </a:r>
+            <a:r>
+              <a:rPr lang="en-US" dirty="0"/>
+              <a:t>’ </a:t>
+            </a:r>
+          </a:p>
+          <a:p>
+            <a:pPr lvl="2"/>
+            <a:r>
+              <a:rPr lang="en-US" dirty="0"/>
+              <a:t>Seems some functions of </a:t>
             </a:r>
             <a:r>
               <a:rPr lang="en-US" dirty="0" err="1"/>
-              <a:t>MapBox</a:t>
-            </a:r>
-            <a:endParaRPr lang="en-US" dirty="0"/>
-          </a:p>
-          <a:p>
-            <a:pPr lvl="1"/>
-            <a:r>
-              <a:rPr lang="en-US" altLang="zh-CN" dirty="0"/>
-              <a:t>Active </a:t>
-            </a:r>
-            <a:r>
-              <a:rPr lang="en-US" altLang="zh-CN" dirty="0" err="1"/>
-              <a:t>Github</a:t>
-            </a:r>
-            <a:r>
-              <a:rPr lang="en-US" altLang="zh-CN" dirty="0"/>
-              <a:t> (6 closed issues in the last month; 450 forks; 4,800 stars)</a:t>
-            </a:r>
-            <a:endParaRPr lang="en-US" dirty="0"/>
-          </a:p>
-          <a:p>
-            <a:r>
-              <a:rPr lang="en-US" dirty="0"/>
-              <a:t>Drawbacks</a:t>
-            </a:r>
-          </a:p>
-          <a:p>
-            <a:pPr lvl="1"/>
-            <a:r>
-              <a:rPr lang="en-US" dirty="0"/>
-              <a:t>Only works with </a:t>
+              <a:t>branca</a:t>
+            </a:r>
+            <a:r>
+              <a:rPr lang="en-US" dirty="0"/>
+              <a:t> are degenerated (and there is no doc for </a:t>
             </a:r>
             <a:r>
               <a:rPr lang="en-US" dirty="0" err="1"/>
-              <a:t>plotly</a:t>
-            </a:r>
-            <a:r>
-              <a:rPr lang="en-US" dirty="0"/>
-              <a:t> graphs. Other libraries like matplotlib not supported. </a:t>
-            </a:r>
-          </a:p>
-          <a:p>
-            <a:pPr lvl="1"/>
-            <a:r>
-              <a:rPr lang="en-US" dirty="0"/>
-              <a:t>To use maps, a </a:t>
-            </a:r>
-            <a:r>
-              <a:rPr lang="en-US" dirty="0" err="1"/>
-              <a:t>MapBox</a:t>
-            </a:r>
-            <a:r>
-              <a:rPr lang="en-US" dirty="0"/>
-              <a:t> account is required</a:t>
-            </a:r>
-          </a:p>
-          <a:p>
-            <a:pPr lvl="1"/>
-            <a:r>
-              <a:rPr lang="en-US" dirty="0"/>
-              <a:t>Custom shape files (such as Seattle </a:t>
-            </a:r>
-            <a:r>
-              <a:rPr lang="en-US" dirty="0" err="1"/>
-              <a:t>neighbourhoods</a:t>
-            </a:r>
-            <a:r>
-              <a:rPr lang="en-US" dirty="0"/>
-              <a:t>) aren’t supported in maps</a:t>
-            </a:r>
-          </a:p>
-          <a:p>
-            <a:pPr lvl="1"/>
-            <a:endParaRPr lang="en-US" dirty="0"/>
-          </a:p>
-          <a:p>
-            <a:pPr lvl="1"/>
-            <a:endParaRPr lang="en-US" dirty="0"/>
-          </a:p>
-          <a:p>
-            <a:pPr lvl="1"/>
-            <a:endParaRPr lang="en-US" dirty="0"/>
+              <a:t>branca</a:t>
+            </a:r>
+            <a:r>
+              <a:rPr lang="en-US" dirty="0"/>
+              <a:t>)</a:t>
+            </a:r>
           </a:p>
           <a:p>
             <a:pPr lvl="1"/>
@@ -5563,7 +5849,7 @@
     </p:spTree>
     <p:extLst>
       <p:ext uri="{BB962C8B-B14F-4D97-AF65-F5344CB8AC3E}">
-        <p14:creationId xmlns:p14="http://schemas.microsoft.com/office/powerpoint/2010/main" val="445099967"/>
+        <p14:creationId xmlns:p14="http://schemas.microsoft.com/office/powerpoint/2010/main" val="3915264646"/>
       </p:ext>
     </p:extLst>
   </p:cSld>
@@ -5590,6 +5876,228 @@
           <a:chExt cx="0" cy="0"/>
         </a:xfrm>
       </p:grpSpPr>
+      <p:sp>
+        <p:nvSpPr>
+          <p:cNvPr id="4" name="Title 3">
+            <a:extLst>
+              <a:ext uri="{FF2B5EF4-FFF2-40B4-BE49-F238E27FC236}">
+                <a16:creationId xmlns:a16="http://schemas.microsoft.com/office/drawing/2014/main" id="{3C0B0A9A-2705-4AA3-9255-5BD4A8B31D95}"/>
+              </a:ext>
+            </a:extLst>
+          </p:cNvPr>
+          <p:cNvSpPr>
+            <a:spLocks noGrp="1"/>
+          </p:cNvSpPr>
+          <p:nvPr>
+            <p:ph type="title"/>
+          </p:nvPr>
+        </p:nvSpPr>
+        <p:spPr/>
+        <p:txBody>
+          <a:bodyPr/>
+          <a:lstStyle/>
+          <a:p>
+            <a:r>
+              <a:rPr lang="en-US" sz="3600" dirty="0"/>
+              <a:t>Collisions in Washington State</a:t>
+            </a:r>
+            <a:br>
+              <a:rPr lang="en-US" dirty="0"/>
+            </a:br>
+            <a:r>
+              <a:rPr lang="en-US" dirty="0"/>
+              <a:t>Using Dash </a:t>
+            </a:r>
+          </a:p>
+        </p:txBody>
+      </p:sp>
+      <p:sp>
+        <p:nvSpPr>
+          <p:cNvPr id="8" name="Content Placeholder 4">
+            <a:extLst>
+              <a:ext uri="{FF2B5EF4-FFF2-40B4-BE49-F238E27FC236}">
+                <a16:creationId xmlns:a16="http://schemas.microsoft.com/office/drawing/2014/main" id="{A4ED4195-C0DD-4DB3-B7B1-A753E90C2BA7}"/>
+              </a:ext>
+            </a:extLst>
+          </p:cNvPr>
+          <p:cNvSpPr>
+            <a:spLocks noGrp="1"/>
+          </p:cNvSpPr>
+          <p:nvPr>
+            <p:ph idx="1"/>
+          </p:nvPr>
+        </p:nvSpPr>
+        <p:spPr>
+          <a:xfrm>
+            <a:off x="653561" y="1588232"/>
+            <a:ext cx="10515600" cy="4351338"/>
+          </a:xfrm>
+        </p:spPr>
+        <p:txBody>
+          <a:bodyPr>
+            <a:normAutofit/>
+          </a:bodyPr>
+          <a:lstStyle/>
+          <a:p>
+            <a:r>
+              <a:rPr lang="en-US" dirty="0"/>
+              <a:t>Appeal</a:t>
+            </a:r>
+          </a:p>
+          <a:p>
+            <a:pPr lvl="1"/>
+            <a:r>
+              <a:rPr lang="en-US" dirty="0"/>
+              <a:t>Easy to draw interactive charts using </a:t>
+            </a:r>
+            <a:r>
+              <a:rPr lang="en-US" dirty="0" err="1"/>
+              <a:t>plotly</a:t>
+            </a:r>
+            <a:endParaRPr lang="en-US" dirty="0"/>
+          </a:p>
+          <a:p>
+            <a:pPr lvl="1"/>
+            <a:r>
+              <a:rPr lang="en-US" dirty="0"/>
+              <a:t>Great documentation for supported charts</a:t>
+            </a:r>
+          </a:p>
+          <a:p>
+            <a:pPr lvl="1"/>
+            <a:r>
+              <a:rPr lang="en-US" dirty="0" err="1"/>
+              <a:t>Plotly</a:t>
+            </a:r>
+            <a:r>
+              <a:rPr lang="en-US" dirty="0"/>
+              <a:t> provides capabilities for maps using </a:t>
+            </a:r>
+            <a:r>
+              <a:rPr lang="en-US" dirty="0" err="1"/>
+              <a:t>MapBox</a:t>
+            </a:r>
+            <a:endParaRPr lang="en-US" dirty="0"/>
+          </a:p>
+          <a:p>
+            <a:pPr lvl="1"/>
+            <a:r>
+              <a:rPr lang="en-US" altLang="zh-CN" dirty="0"/>
+              <a:t>Active </a:t>
+            </a:r>
+            <a:r>
+              <a:rPr lang="en-US" altLang="zh-CN" dirty="0" err="1"/>
+              <a:t>Github</a:t>
+            </a:r>
+            <a:r>
+              <a:rPr lang="en-US" altLang="zh-CN" dirty="0"/>
+              <a:t> (6 closed issues in the last month; 450 forks; 4,800 stars)</a:t>
+            </a:r>
+            <a:endParaRPr lang="en-US" dirty="0"/>
+          </a:p>
+          <a:p>
+            <a:r>
+              <a:rPr lang="en-US" dirty="0"/>
+              <a:t>Drawbacks</a:t>
+            </a:r>
+          </a:p>
+          <a:p>
+            <a:pPr lvl="1"/>
+            <a:r>
+              <a:rPr lang="en-US" dirty="0"/>
+              <a:t>Only works with </a:t>
+            </a:r>
+            <a:r>
+              <a:rPr lang="en-US" dirty="0" err="1"/>
+              <a:t>plotly</a:t>
+            </a:r>
+            <a:r>
+              <a:rPr lang="en-US" dirty="0"/>
+              <a:t> graphs. Other libraries like matplotlib not supported. </a:t>
+            </a:r>
+          </a:p>
+          <a:p>
+            <a:pPr lvl="1"/>
+            <a:r>
+              <a:rPr lang="en-US" dirty="0"/>
+              <a:t>To use maps, a </a:t>
+            </a:r>
+            <a:r>
+              <a:rPr lang="en-US" dirty="0" err="1"/>
+              <a:t>MapBox</a:t>
+            </a:r>
+            <a:r>
+              <a:rPr lang="en-US" dirty="0"/>
+              <a:t> account is required</a:t>
+            </a:r>
+          </a:p>
+          <a:p>
+            <a:pPr lvl="1"/>
+            <a:r>
+              <a:rPr lang="en-US" dirty="0"/>
+              <a:t>Custom shape files (such as Seattle </a:t>
+            </a:r>
+            <a:r>
+              <a:rPr lang="en-US" dirty="0" err="1"/>
+              <a:t>neighbourhoods</a:t>
+            </a:r>
+            <a:r>
+              <a:rPr lang="en-US" dirty="0"/>
+              <a:t>) aren’t supported in maps</a:t>
+            </a:r>
+          </a:p>
+          <a:p>
+            <a:pPr lvl="1"/>
+            <a:endParaRPr lang="en-US" dirty="0"/>
+          </a:p>
+          <a:p>
+            <a:pPr lvl="1"/>
+            <a:endParaRPr lang="en-US" dirty="0"/>
+          </a:p>
+          <a:p>
+            <a:pPr lvl="1"/>
+            <a:endParaRPr lang="en-US" dirty="0"/>
+          </a:p>
+          <a:p>
+            <a:pPr lvl="1"/>
+            <a:endParaRPr lang="en-US" dirty="0"/>
+          </a:p>
+          <a:p>
+            <a:pPr lvl="1"/>
+            <a:endParaRPr lang="en-US" dirty="0"/>
+          </a:p>
+        </p:txBody>
+      </p:sp>
+    </p:spTree>
+    <p:extLst>
+      <p:ext uri="{BB962C8B-B14F-4D97-AF65-F5344CB8AC3E}">
+        <p14:creationId xmlns:p14="http://schemas.microsoft.com/office/powerpoint/2010/main" val="445099967"/>
+      </p:ext>
+    </p:extLst>
+  </p:cSld>
+  <p:clrMapOvr>
+    <a:masterClrMapping/>
+  </p:clrMapOvr>
+</p:sld>
+</file>
+
+<file path=ppt/slides/slide8.xml><?xml version="1.0" encoding="utf-8"?>
+<p:sld xmlns:a="http://schemas.openxmlformats.org/drawingml/2006/main" xmlns:r="http://schemas.openxmlformats.org/officeDocument/2006/relationships" xmlns:p="http://schemas.openxmlformats.org/presentationml/2006/main">
+  <p:cSld>
+    <p:spTree>
+      <p:nvGrpSpPr>
+        <p:cNvPr id="1" name=""/>
+        <p:cNvGrpSpPr/>
+        <p:nvPr/>
+      </p:nvGrpSpPr>
+      <p:grpSpPr>
+        <a:xfrm>
+          <a:off x="0" y="0"/>
+          <a:ext cx="0" cy="0"/>
+          <a:chOff x="0" y="0"/>
+          <a:chExt cx="0" cy="0"/>
+        </a:xfrm>
+      </p:grpSpPr>
       <p:pic>
         <p:nvPicPr>
           <p:cNvPr id="9" name="Content Placeholder 8">
@@ -5714,7 +6222,7 @@
 </p:sld>
 </file>
 
-<file path=ppt/slides/slide8.xml><?xml version="1.0" encoding="utf-8"?>
+<file path=ppt/slides/slide9.xml><?xml version="1.0" encoding="utf-8"?>
 <p:sld xmlns:a="http://schemas.openxmlformats.org/drawingml/2006/main" xmlns:r="http://schemas.openxmlformats.org/officeDocument/2006/relationships" xmlns:p="http://schemas.openxmlformats.org/presentationml/2006/main">
   <p:cSld>
     <p:spTree>

</xml_diff>